<commit_message>
fix formatting on SEM path figures
</commit_message>
<xml_diff>
--- a/figures/BagExpt_SEM_Final_Figures.pptx
+++ b/figures/BagExpt_SEM_Final_Figures.pptx
@@ -105,7 +105,112 @@
       </a:defRPr>
     </a:lvl9pPr>
   </p:defaultTextStyle>
+  <p:extLst>
+    <p:ext uri="{EFAFB233-063F-42B5-8137-9DF3F51BA10A}">
+      <p15:sldGuideLst xmlns:p15="http://schemas.microsoft.com/office/powerpoint/2012/main"/>
+    </p:ext>
+  </p:extLst>
 </p:presentation>
+</file>
+
+<file path=ppt/changesInfos/changesInfo1.xml><?xml version="1.0" encoding="utf-8"?>
+<pc:chgInfo xmlns:a="http://schemas.openxmlformats.org/drawingml/2006/main" xmlns:r="http://schemas.openxmlformats.org/officeDocument/2006/relationships" xmlns:ac="http://schemas.microsoft.com/office/drawing/2013/main/command" xmlns:pc="http://schemas.microsoft.com/office/powerpoint/2013/main/command">
+  <pc:docChgLst>
+    <pc:chgData name="Fearon, Michelle" userId="a9975605-5b01-4453-b093-ebef4a050471" providerId="ADAL" clId="{D4C2BEA3-74EB-4C94-A611-476267974A9F}"/>
+    <pc:docChg chg="modSld">
+      <pc:chgData name="Fearon, Michelle" userId="a9975605-5b01-4453-b093-ebef4a050471" providerId="ADAL" clId="{D4C2BEA3-74EB-4C94-A611-476267974A9F}" dt="2023-01-13T19:22:19.128" v="39" actId="20577"/>
+      <pc:docMkLst>
+        <pc:docMk/>
+      </pc:docMkLst>
+      <pc:sldChg chg="modSp mod">
+        <pc:chgData name="Fearon, Michelle" userId="a9975605-5b01-4453-b093-ebef4a050471" providerId="ADAL" clId="{D4C2BEA3-74EB-4C94-A611-476267974A9F}" dt="2023-01-13T19:22:19.128" v="39" actId="20577"/>
+        <pc:sldMkLst>
+          <pc:docMk/>
+          <pc:sldMk cId="4220226303" sldId="256"/>
+        </pc:sldMkLst>
+        <pc:spChg chg="mod">
+          <ac:chgData name="Fearon, Michelle" userId="a9975605-5b01-4453-b093-ebef4a050471" providerId="ADAL" clId="{D4C2BEA3-74EB-4C94-A611-476267974A9F}" dt="2023-01-13T19:20:27.044" v="11" actId="1037"/>
+          <ac:spMkLst>
+            <pc:docMk/>
+            <pc:sldMk cId="4220226303" sldId="256"/>
+            <ac:spMk id="22" creationId="{E7735762-A518-4C77-9BFD-A20D151655CF}"/>
+          </ac:spMkLst>
+        </pc:spChg>
+        <pc:spChg chg="mod">
+          <ac:chgData name="Fearon, Michelle" userId="a9975605-5b01-4453-b093-ebef4a050471" providerId="ADAL" clId="{D4C2BEA3-74EB-4C94-A611-476267974A9F}" dt="2023-01-13T19:20:38.702" v="12" actId="20577"/>
+          <ac:spMkLst>
+            <pc:docMk/>
+            <pc:sldMk cId="4220226303" sldId="256"/>
+            <ac:spMk id="34" creationId="{F0666089-D99D-4069-9204-C848B67AB6D4}"/>
+          </ac:spMkLst>
+        </pc:spChg>
+        <pc:spChg chg="mod">
+          <ac:chgData name="Fearon, Michelle" userId="a9975605-5b01-4453-b093-ebef4a050471" providerId="ADAL" clId="{D4C2BEA3-74EB-4C94-A611-476267974A9F}" dt="2023-01-13T19:22:19.128" v="39" actId="20577"/>
+          <ac:spMkLst>
+            <pc:docMk/>
+            <pc:sldMk cId="4220226303" sldId="256"/>
+            <ac:spMk id="42" creationId="{C4F5877D-0070-4D4D-9D69-C71D91EFE606}"/>
+          </ac:spMkLst>
+        </pc:spChg>
+        <pc:spChg chg="mod">
+          <ac:chgData name="Fearon, Michelle" userId="a9975605-5b01-4453-b093-ebef4a050471" providerId="ADAL" clId="{D4C2BEA3-74EB-4C94-A611-476267974A9F}" dt="2023-01-13T19:22:15.804" v="38" actId="20577"/>
+          <ac:spMkLst>
+            <pc:docMk/>
+            <pc:sldMk cId="4220226303" sldId="256"/>
+            <ac:spMk id="43" creationId="{9AFC6819-B198-4DC0-A2D5-ABC47B26EF4F}"/>
+          </ac:spMkLst>
+        </pc:spChg>
+      </pc:sldChg>
+      <pc:sldChg chg="modSp mod">
+        <pc:chgData name="Fearon, Michelle" userId="a9975605-5b01-4453-b093-ebef4a050471" providerId="ADAL" clId="{D4C2BEA3-74EB-4C94-A611-476267974A9F}" dt="2023-01-13T19:22:12.025" v="37" actId="20577"/>
+        <pc:sldMkLst>
+          <pc:docMk/>
+          <pc:sldMk cId="858079376" sldId="257"/>
+        </pc:sldMkLst>
+        <pc:spChg chg="mod">
+          <ac:chgData name="Fearon, Michelle" userId="a9975605-5b01-4453-b093-ebef4a050471" providerId="ADAL" clId="{D4C2BEA3-74EB-4C94-A611-476267974A9F}" dt="2023-01-13T19:22:09.050" v="36" actId="20577"/>
+          <ac:spMkLst>
+            <pc:docMk/>
+            <pc:sldMk cId="858079376" sldId="257"/>
+            <ac:spMk id="25" creationId="{B3B6DE93-AA48-4A0C-9FD1-D7FB54C8EC20}"/>
+          </ac:spMkLst>
+        </pc:spChg>
+        <pc:spChg chg="mod">
+          <ac:chgData name="Fearon, Michelle" userId="a9975605-5b01-4453-b093-ebef4a050471" providerId="ADAL" clId="{D4C2BEA3-74EB-4C94-A611-476267974A9F}" dt="2023-01-13T19:22:12.025" v="37" actId="20577"/>
+          <ac:spMkLst>
+            <pc:docMk/>
+            <pc:sldMk cId="858079376" sldId="257"/>
+            <ac:spMk id="26" creationId="{4E99FBF0-79FE-4D73-A402-959E6ECA20E9}"/>
+          </ac:spMkLst>
+        </pc:spChg>
+        <pc:spChg chg="mod">
+          <ac:chgData name="Fearon, Michelle" userId="a9975605-5b01-4453-b093-ebef4a050471" providerId="ADAL" clId="{D4C2BEA3-74EB-4C94-A611-476267974A9F}" dt="2023-01-13T19:20:50.948" v="14" actId="14100"/>
+          <ac:spMkLst>
+            <pc:docMk/>
+            <pc:sldMk cId="858079376" sldId="257"/>
+            <ac:spMk id="34" creationId="{997570EF-A62D-446D-9967-4C5991787AC3}"/>
+          </ac:spMkLst>
+        </pc:spChg>
+        <pc:spChg chg="mod">
+          <ac:chgData name="Fearon, Michelle" userId="a9975605-5b01-4453-b093-ebef4a050471" providerId="ADAL" clId="{D4C2BEA3-74EB-4C94-A611-476267974A9F}" dt="2023-01-13T19:21:23.866" v="35" actId="1036"/>
+          <ac:spMkLst>
+            <pc:docMk/>
+            <pc:sldMk cId="858079376" sldId="257"/>
+            <ac:spMk id="38" creationId="{825E74EC-2642-4BF0-9454-B5B565276BE5}"/>
+          </ac:spMkLst>
+        </pc:spChg>
+        <pc:spChg chg="mod">
+          <ac:chgData name="Fearon, Michelle" userId="a9975605-5b01-4453-b093-ebef4a050471" providerId="ADAL" clId="{D4C2BEA3-74EB-4C94-A611-476267974A9F}" dt="2023-01-13T19:21:08.248" v="27" actId="1035"/>
+          <ac:spMkLst>
+            <pc:docMk/>
+            <pc:sldMk cId="858079376" sldId="257"/>
+            <ac:spMk id="40" creationId="{83FF81B1-ECC2-4B99-9EAE-3C23DE72EF05}"/>
+          </ac:spMkLst>
+        </pc:spChg>
+      </pc:sldChg>
+    </pc:docChg>
+  </pc:docChgLst>
+</pc:chgInfo>
 </file>
 
 <file path=ppt/slideLayouts/slideLayout1.xml><?xml version="1.0" encoding="utf-8"?>
@@ -255,7 +360,7 @@
           <a:p>
             <a:fld id="{56302F90-7EFD-49D0-85A6-435CC668CCE4}" type="datetimeFigureOut">
               <a:rPr lang="en-US" smtClean="0"/>
-              <a:t>3/28/2022</a:t>
+              <a:t>1/13/2023</a:t>
             </a:fld>
             <a:endParaRPr lang="en-US"/>
           </a:p>
@@ -453,7 +558,7 @@
           <a:p>
             <a:fld id="{56302F90-7EFD-49D0-85A6-435CC668CCE4}" type="datetimeFigureOut">
               <a:rPr lang="en-US" smtClean="0"/>
-              <a:t>3/28/2022</a:t>
+              <a:t>1/13/2023</a:t>
             </a:fld>
             <a:endParaRPr lang="en-US"/>
           </a:p>
@@ -661,7 +766,7 @@
           <a:p>
             <a:fld id="{56302F90-7EFD-49D0-85A6-435CC668CCE4}" type="datetimeFigureOut">
               <a:rPr lang="en-US" smtClean="0"/>
-              <a:t>3/28/2022</a:t>
+              <a:t>1/13/2023</a:t>
             </a:fld>
             <a:endParaRPr lang="en-US"/>
           </a:p>
@@ -859,7 +964,7 @@
           <a:p>
             <a:fld id="{56302F90-7EFD-49D0-85A6-435CC668CCE4}" type="datetimeFigureOut">
               <a:rPr lang="en-US" smtClean="0"/>
-              <a:t>3/28/2022</a:t>
+              <a:t>1/13/2023</a:t>
             </a:fld>
             <a:endParaRPr lang="en-US"/>
           </a:p>
@@ -1134,7 +1239,7 @@
           <a:p>
             <a:fld id="{56302F90-7EFD-49D0-85A6-435CC668CCE4}" type="datetimeFigureOut">
               <a:rPr lang="en-US" smtClean="0"/>
-              <a:t>3/28/2022</a:t>
+              <a:t>1/13/2023</a:t>
             </a:fld>
             <a:endParaRPr lang="en-US"/>
           </a:p>
@@ -1399,7 +1504,7 @@
           <a:p>
             <a:fld id="{56302F90-7EFD-49D0-85A6-435CC668CCE4}" type="datetimeFigureOut">
               <a:rPr lang="en-US" smtClean="0"/>
-              <a:t>3/28/2022</a:t>
+              <a:t>1/13/2023</a:t>
             </a:fld>
             <a:endParaRPr lang="en-US"/>
           </a:p>
@@ -1811,7 +1916,7 @@
           <a:p>
             <a:fld id="{56302F90-7EFD-49D0-85A6-435CC668CCE4}" type="datetimeFigureOut">
               <a:rPr lang="en-US" smtClean="0"/>
-              <a:t>3/28/2022</a:t>
+              <a:t>1/13/2023</a:t>
             </a:fld>
             <a:endParaRPr lang="en-US"/>
           </a:p>
@@ -1952,7 +2057,7 @@
           <a:p>
             <a:fld id="{56302F90-7EFD-49D0-85A6-435CC668CCE4}" type="datetimeFigureOut">
               <a:rPr lang="en-US" smtClean="0"/>
-              <a:t>3/28/2022</a:t>
+              <a:t>1/13/2023</a:t>
             </a:fld>
             <a:endParaRPr lang="en-US"/>
           </a:p>
@@ -2065,7 +2170,7 @@
           <a:p>
             <a:fld id="{56302F90-7EFD-49D0-85A6-435CC668CCE4}" type="datetimeFigureOut">
               <a:rPr lang="en-US" smtClean="0"/>
-              <a:t>3/28/2022</a:t>
+              <a:t>1/13/2023</a:t>
             </a:fld>
             <a:endParaRPr lang="en-US"/>
           </a:p>
@@ -2376,7 +2481,7 @@
           <a:p>
             <a:fld id="{56302F90-7EFD-49D0-85A6-435CC668CCE4}" type="datetimeFigureOut">
               <a:rPr lang="en-US" smtClean="0"/>
-              <a:t>3/28/2022</a:t>
+              <a:t>1/13/2023</a:t>
             </a:fld>
             <a:endParaRPr lang="en-US"/>
           </a:p>
@@ -2664,7 +2769,7 @@
           <a:p>
             <a:fld id="{56302F90-7EFD-49D0-85A6-435CC668CCE4}" type="datetimeFigureOut">
               <a:rPr lang="en-US" smtClean="0"/>
-              <a:t>3/28/2022</a:t>
+              <a:t>1/13/2023</a:t>
             </a:fld>
             <a:endParaRPr lang="en-US"/>
           </a:p>
@@ -2905,7 +3010,7 @@
           <a:p>
             <a:fld id="{56302F90-7EFD-49D0-85A6-435CC668CCE4}" type="datetimeFigureOut">
               <a:rPr lang="en-US" smtClean="0"/>
-              <a:t>3/28/2022</a:t>
+              <a:t>1/13/2023</a:t>
             </a:fld>
             <a:endParaRPr lang="en-US"/>
           </a:p>
@@ -3337,9 +3442,9 @@
         <p:grpSpPr>
           <a:xfrm>
             <a:off x="693274" y="1669616"/>
-            <a:ext cx="5864725" cy="4762278"/>
+            <a:ext cx="5768926" cy="4762278"/>
             <a:chOff x="435822" y="3081165"/>
-            <a:chExt cx="5864725" cy="4762278"/>
+            <a:chExt cx="5768926" cy="4762278"/>
           </a:xfrm>
         </p:grpSpPr>
         <p:sp>
@@ -4022,7 +4127,7 @@
           </p:nvSpPr>
           <p:spPr>
             <a:xfrm>
-              <a:off x="5176283" y="5742533"/>
+              <a:off x="5080484" y="5742533"/>
               <a:ext cx="1124264" cy="369332"/>
             </a:xfrm>
             <a:prstGeom prst="rect">
@@ -4039,7 +4144,7 @@
               <a:pPr algn="ctr"/>
               <a:r>
                 <a:rPr lang="en-US" dirty="0"/>
-                <a:t>0.15</a:t>
+                <a:t>+0.15</a:t>
               </a:r>
             </a:p>
           </p:txBody>
@@ -4560,7 +4665,7 @@
           <p:spPr>
             <a:xfrm>
               <a:off x="3402556" y="6605282"/>
-              <a:ext cx="997306" cy="369332"/>
+              <a:ext cx="997306" cy="646331"/>
             </a:xfrm>
             <a:prstGeom prst="rect">
               <a:avLst/>
@@ -4576,7 +4681,7 @@
               <a:pPr algn="ctr"/>
               <a:r>
                 <a:rPr lang="en-US" dirty="0"/>
-                <a:t>0.56***</a:t>
+                <a:t>+0.56***</a:t>
               </a:r>
             </a:p>
           </p:txBody>
@@ -4924,13 +5029,13 @@
               <a:t>a. </a:t>
             </a:r>
             <a:r>
-              <a:rPr lang="en-US" sz="1800" b="1" i="0" u="none" strike="noStrike" dirty="0">
+              <a:rPr lang="en-US" sz="1800" b="1" i="0" u="none" strike="noStrike">
                 <a:solidFill>
                   <a:srgbClr val="000000"/>
                 </a:solidFill>
                 <a:effectLst/>
               </a:rPr>
-              <a:t>+spores </a:t>
+              <a:t>+Spores </a:t>
             </a:r>
             <a:r>
               <a:rPr lang="en-US" b="1" dirty="0"/>
@@ -4978,7 +5083,7 @@
                 </a:solidFill>
                 <a:effectLst/>
               </a:rPr>
-              <a:t>–spores </a:t>
+              <a:t>–Spores </a:t>
             </a:r>
             <a:r>
               <a:rPr lang="en-US" b="1" dirty="0"/>
@@ -5922,7 +6027,7 @@
                 </a:solidFill>
                 <a:effectLst/>
               </a:rPr>
-              <a:t>+spores </a:t>
+              <a:t>+Spores </a:t>
             </a:r>
             <a:r>
               <a:rPr lang="en-US" b="1" dirty="0"/>
@@ -5970,7 +6075,7 @@
                 </a:solidFill>
                 <a:effectLst/>
               </a:rPr>
-              <a:t>–spores </a:t>
+              <a:t>–Spores </a:t>
             </a:r>
             <a:r>
               <a:rPr lang="en-US" b="1" dirty="0"/>
@@ -6317,7 +6422,7 @@
           <p:spPr>
             <a:xfrm>
               <a:off x="3447236" y="6605282"/>
-              <a:ext cx="997306" cy="369332"/>
+              <a:ext cx="1086836" cy="369332"/>
             </a:xfrm>
             <a:prstGeom prst="rect">
               <a:avLst/>
@@ -6335,7 +6440,7 @@
               <a:pPr algn="ctr"/>
               <a:r>
                 <a:rPr lang="en-US" dirty="0"/>
-                <a:t>0.50***</a:t>
+                <a:t>+0.50***</a:t>
               </a:r>
             </a:p>
           </p:txBody>
@@ -6450,7 +6555,7 @@
           </p:nvSpPr>
           <p:spPr>
             <a:xfrm>
-              <a:off x="1683058" y="3552438"/>
+              <a:off x="1648222" y="3587274"/>
               <a:ext cx="997937" cy="369332"/>
             </a:xfrm>
             <a:prstGeom prst="rect">
@@ -6470,7 +6575,7 @@
               <a:pPr algn="ctr"/>
               <a:r>
                 <a:rPr lang="en-US" dirty="0"/>
-                <a:t>+0.24</a:t>
+                <a:t>0.24</a:t>
               </a:r>
             </a:p>
           </p:txBody>
@@ -6535,7 +6640,7 @@
           </p:nvSpPr>
           <p:spPr>
             <a:xfrm>
-              <a:off x="1591561" y="4465438"/>
+              <a:off x="1617688" y="4387057"/>
               <a:ext cx="947563" cy="369332"/>
             </a:xfrm>
             <a:prstGeom prst="rect">

</xml_diff>

<commit_message>
Final updates on figures, added infection prevalence SEM figs for appendix
</commit_message>
<xml_diff>
--- a/figures/BagExpt_SEM_Final_Figures.pptx
+++ b/figures/BagExpt_SEM_Final_Figures.pptx
@@ -7,6 +7,7 @@
   <p:sldIdLst>
     <p:sldId id="256" r:id="rId2"/>
     <p:sldId id="257" r:id="rId3"/>
+    <p:sldId id="258" r:id="rId4"/>
   </p:sldIdLst>
   <p:sldSz cx="12192000" cy="6858000"/>
   <p:notesSz cx="7315200" cy="9601200"/>
@@ -116,7 +117,7 @@
 <file path=ppt/revisionInfo.xml><?xml version="1.0" encoding="utf-8"?>
 <p1510:revInfo xmlns:a="http://schemas.openxmlformats.org/drawingml/2006/main" xmlns:r="http://schemas.openxmlformats.org/officeDocument/2006/relationships" xmlns:p1510="http://schemas.microsoft.com/office/powerpoint/2015/10/main">
   <p1510:revLst>
-    <p1510:client id="{D4C2BEA3-74EB-4C94-A611-476267974A9F}" v="10" dt="2023-01-19T16:32:17.091"/>
+    <p1510:client id="{D4C2BEA3-74EB-4C94-A611-476267974A9F}" v="15" dt="2023-01-26T14:19:36.304"/>
   </p1510:revLst>
 </p1510:revInfo>
 </file>
@@ -125,19 +126,19 @@
 <pc:chgInfo xmlns:a="http://schemas.openxmlformats.org/drawingml/2006/main" xmlns:r="http://schemas.openxmlformats.org/officeDocument/2006/relationships" xmlns:ac="http://schemas.microsoft.com/office/drawing/2013/main/command" xmlns:pc="http://schemas.microsoft.com/office/powerpoint/2013/main/command">
   <pc:docChgLst>
     <pc:chgData name="Fearon, Michelle" userId="a9975605-5b01-4453-b093-ebef4a050471" providerId="ADAL" clId="{D4C2BEA3-74EB-4C94-A611-476267974A9F}"/>
-    <pc:docChg chg="undo custSel modSld">
-      <pc:chgData name="Fearon, Michelle" userId="a9975605-5b01-4453-b093-ebef4a050471" providerId="ADAL" clId="{D4C2BEA3-74EB-4C94-A611-476267974A9F}" dt="2023-01-19T16:47:20.830" v="505" actId="1038"/>
+    <pc:docChg chg="undo custSel addSld modSld">
+      <pc:chgData name="Fearon, Michelle" userId="a9975605-5b01-4453-b093-ebef4a050471" providerId="ADAL" clId="{D4C2BEA3-74EB-4C94-A611-476267974A9F}" dt="2023-01-26T14:19:54.022" v="934" actId="14100"/>
       <pc:docMkLst>
         <pc:docMk/>
       </pc:docMkLst>
       <pc:sldChg chg="addSp delSp modSp mod">
-        <pc:chgData name="Fearon, Michelle" userId="a9975605-5b01-4453-b093-ebef4a050471" providerId="ADAL" clId="{D4C2BEA3-74EB-4C94-A611-476267974A9F}" dt="2023-01-19T16:46:31.026" v="473" actId="207"/>
+        <pc:chgData name="Fearon, Michelle" userId="a9975605-5b01-4453-b093-ebef4a050471" providerId="ADAL" clId="{D4C2BEA3-74EB-4C94-A611-476267974A9F}" dt="2023-01-26T14:13:03.634" v="792" actId="1076"/>
         <pc:sldMkLst>
           <pc:docMk/>
           <pc:sldMk cId="4220226303" sldId="256"/>
         </pc:sldMkLst>
         <pc:spChg chg="mod">
-          <ac:chgData name="Fearon, Michelle" userId="a9975605-5b01-4453-b093-ebef4a050471" providerId="ADAL" clId="{D4C2BEA3-74EB-4C94-A611-476267974A9F}" dt="2023-01-19T15:49:31.319" v="211" actId="1038"/>
+          <ac:chgData name="Fearon, Michelle" userId="a9975605-5b01-4453-b093-ebef4a050471" providerId="ADAL" clId="{D4C2BEA3-74EB-4C94-A611-476267974A9F}" dt="2023-01-24T18:40:38.253" v="508"/>
           <ac:spMkLst>
             <pc:docMk/>
             <pc:sldMk cId="4220226303" sldId="256"/>
@@ -169,6 +170,14 @@
           </ac:spMkLst>
         </pc:spChg>
         <pc:spChg chg="mod">
+          <ac:chgData name="Fearon, Michelle" userId="a9975605-5b01-4453-b093-ebef4a050471" providerId="ADAL" clId="{D4C2BEA3-74EB-4C94-A611-476267974A9F}" dt="2023-01-26T14:13:03.634" v="792" actId="1076"/>
+          <ac:spMkLst>
+            <pc:docMk/>
+            <pc:sldMk cId="4220226303" sldId="256"/>
+            <ac:spMk id="13" creationId="{DA94F67D-964D-4F86-A62B-5108E0127417}"/>
+          </ac:spMkLst>
+        </pc:spChg>
+        <pc:spChg chg="mod">
           <ac:chgData name="Fearon, Michelle" userId="a9975605-5b01-4453-b093-ebef4a050471" providerId="ADAL" clId="{D4C2BEA3-74EB-4C94-A611-476267974A9F}" dt="2023-01-19T15:46:00.364" v="144" actId="20577"/>
           <ac:spMkLst>
             <pc:docMk/>
@@ -209,7 +218,7 @@
           </ac:spMkLst>
         </pc:spChg>
         <pc:spChg chg="mod">
-          <ac:chgData name="Fearon, Michelle" userId="a9975605-5b01-4453-b093-ebef4a050471" providerId="ADAL" clId="{D4C2BEA3-74EB-4C94-A611-476267974A9F}" dt="2023-01-19T15:48:58.808" v="181" actId="1037"/>
+          <ac:chgData name="Fearon, Michelle" userId="a9975605-5b01-4453-b093-ebef4a050471" providerId="ADAL" clId="{D4C2BEA3-74EB-4C94-A611-476267974A9F}" dt="2023-01-24T18:40:34.027" v="507" actId="114"/>
           <ac:spMkLst>
             <pc:docMk/>
             <pc:sldMk cId="4220226303" sldId="256"/>
@@ -361,7 +370,7 @@
           </ac:cxnSpMkLst>
         </pc:cxnChg>
         <pc:cxnChg chg="mod">
-          <ac:chgData name="Fearon, Michelle" userId="a9975605-5b01-4453-b093-ebef4a050471" providerId="ADAL" clId="{D4C2BEA3-74EB-4C94-A611-476267974A9F}" dt="2023-01-19T16:31:02.633" v="464" actId="14100"/>
+          <ac:chgData name="Fearon, Michelle" userId="a9975605-5b01-4453-b093-ebef4a050471" providerId="ADAL" clId="{D4C2BEA3-74EB-4C94-A611-476267974A9F}" dt="2023-01-26T14:08:14.658" v="729" actId="692"/>
           <ac:cxnSpMkLst>
             <pc:docMk/>
             <pc:sldMk cId="4220226303" sldId="256"/>
@@ -385,7 +394,7 @@
           </ac:cxnSpMkLst>
         </pc:cxnChg>
         <pc:cxnChg chg="add mod">
-          <ac:chgData name="Fearon, Michelle" userId="a9975605-5b01-4453-b093-ebef4a050471" providerId="ADAL" clId="{D4C2BEA3-74EB-4C94-A611-476267974A9F}" dt="2023-01-19T16:01:57.487" v="398" actId="14100"/>
+          <ac:chgData name="Fearon, Michelle" userId="a9975605-5b01-4453-b093-ebef4a050471" providerId="ADAL" clId="{D4C2BEA3-74EB-4C94-A611-476267974A9F}" dt="2023-01-26T14:08:17.821" v="730" actId="692"/>
           <ac:cxnSpMkLst>
             <pc:docMk/>
             <pc:sldMk cId="4220226303" sldId="256"/>
@@ -394,7 +403,7 @@
         </pc:cxnChg>
       </pc:sldChg>
       <pc:sldChg chg="addSp delSp modSp mod">
-        <pc:chgData name="Fearon, Michelle" userId="a9975605-5b01-4453-b093-ebef4a050471" providerId="ADAL" clId="{D4C2BEA3-74EB-4C94-A611-476267974A9F}" dt="2023-01-19T16:47:20.830" v="505" actId="1038"/>
+        <pc:chgData name="Fearon, Michelle" userId="a9975605-5b01-4453-b093-ebef4a050471" providerId="ADAL" clId="{D4C2BEA3-74EB-4C94-A611-476267974A9F}" dt="2023-01-26T14:08:37.520" v="733" actId="692"/>
         <pc:sldMkLst>
           <pc:docMk/>
           <pc:sldMk cId="858079376" sldId="257"/>
@@ -408,7 +417,7 @@
           </ac:spMkLst>
         </pc:spChg>
         <pc:spChg chg="mod">
-          <ac:chgData name="Fearon, Michelle" userId="a9975605-5b01-4453-b093-ebef4a050471" providerId="ADAL" clId="{D4C2BEA3-74EB-4C94-A611-476267974A9F}" dt="2023-01-19T16:03:45.053" v="412" actId="1076"/>
+          <ac:chgData name="Fearon, Michelle" userId="a9975605-5b01-4453-b093-ebef4a050471" providerId="ADAL" clId="{D4C2BEA3-74EB-4C94-A611-476267974A9F}" dt="2023-01-24T18:40:43.752" v="510"/>
           <ac:spMkLst>
             <pc:docMk/>
             <pc:sldMk cId="858079376" sldId="257"/>
@@ -504,7 +513,7 @@
           </ac:spMkLst>
         </pc:spChg>
         <pc:spChg chg="mod">
-          <ac:chgData name="Fearon, Michelle" userId="a9975605-5b01-4453-b093-ebef4a050471" providerId="ADAL" clId="{D4C2BEA3-74EB-4C94-A611-476267974A9F}" dt="2023-01-19T16:26:45.122" v="443" actId="1076"/>
+          <ac:chgData name="Fearon, Michelle" userId="a9975605-5b01-4453-b093-ebef4a050471" providerId="ADAL" clId="{D4C2BEA3-74EB-4C94-A611-476267974A9F}" dt="2023-01-24T18:40:41.535" v="509"/>
           <ac:spMkLst>
             <pc:docMk/>
             <pc:sldMk cId="858079376" sldId="257"/>
@@ -575,6 +584,14 @@
             <ac:spMk id="44" creationId="{846415F5-63FF-CBA2-AC33-367A44AB3E81}"/>
           </ac:spMkLst>
         </pc:spChg>
+        <pc:spChg chg="add del">
+          <ac:chgData name="Fearon, Michelle" userId="a9975605-5b01-4453-b093-ebef4a050471" providerId="ADAL" clId="{D4C2BEA3-74EB-4C94-A611-476267974A9F}" dt="2023-01-26T13:29:38.870" v="512" actId="22"/>
+          <ac:spMkLst>
+            <pc:docMk/>
+            <pc:sldMk cId="858079376" sldId="257"/>
+            <ac:spMk id="45" creationId="{6826B79C-0A4D-CC09-86F8-C217267EAD1A}"/>
+          </ac:spMkLst>
+        </pc:spChg>
         <pc:grpChg chg="mod">
           <ac:chgData name="Fearon, Michelle" userId="a9975605-5b01-4453-b093-ebef4a050471" providerId="ADAL" clId="{D4C2BEA3-74EB-4C94-A611-476267974A9F}" dt="2023-01-19T16:25:23.723" v="431" actId="164"/>
           <ac:grpSpMkLst>
@@ -608,7 +625,7 @@
           </ac:grpSpMkLst>
         </pc:grpChg>
         <pc:cxnChg chg="add mod">
-          <ac:chgData name="Fearon, Michelle" userId="a9975605-5b01-4453-b093-ebef4a050471" providerId="ADAL" clId="{D4C2BEA3-74EB-4C94-A611-476267974A9F}" dt="2023-01-19T16:25:23.723" v="431" actId="164"/>
+          <ac:chgData name="Fearon, Michelle" userId="a9975605-5b01-4453-b093-ebef4a050471" providerId="ADAL" clId="{D4C2BEA3-74EB-4C94-A611-476267974A9F}" dt="2023-01-26T14:08:29.811" v="731" actId="692"/>
           <ac:cxnSpMkLst>
             <pc:docMk/>
             <pc:sldMk cId="858079376" sldId="257"/>
@@ -672,11 +689,378 @@
           </ac:cxnSpMkLst>
         </pc:cxnChg>
         <pc:cxnChg chg="mod">
-          <ac:chgData name="Fearon, Michelle" userId="a9975605-5b01-4453-b093-ebef4a050471" providerId="ADAL" clId="{D4C2BEA3-74EB-4C94-A611-476267974A9F}" dt="2023-01-19T16:30:31.084" v="461" actId="14100"/>
+          <ac:chgData name="Fearon, Michelle" userId="a9975605-5b01-4453-b093-ebef4a050471" providerId="ADAL" clId="{D4C2BEA3-74EB-4C94-A611-476267974A9F}" dt="2023-01-26T14:08:37.520" v="733" actId="692"/>
           <ac:cxnSpMkLst>
             <pc:docMk/>
             <pc:sldMk cId="858079376" sldId="257"/>
             <ac:cxnSpMk id="42" creationId="{BF47C35C-3E47-41D4-A5AF-C931C790E38D}"/>
+          </ac:cxnSpMkLst>
+        </pc:cxnChg>
+      </pc:sldChg>
+      <pc:sldChg chg="addSp delSp modSp add mod">
+        <pc:chgData name="Fearon, Michelle" userId="a9975605-5b01-4453-b093-ebef4a050471" providerId="ADAL" clId="{D4C2BEA3-74EB-4C94-A611-476267974A9F}" dt="2023-01-26T14:19:54.022" v="934" actId="14100"/>
+        <pc:sldMkLst>
+          <pc:docMk/>
+          <pc:sldMk cId="4004654632" sldId="258"/>
+        </pc:sldMkLst>
+        <pc:spChg chg="mod">
+          <ac:chgData name="Fearon, Michelle" userId="a9975605-5b01-4453-b093-ebef4a050471" providerId="ADAL" clId="{D4C2BEA3-74EB-4C94-A611-476267974A9F}" dt="2023-01-26T13:31:40.705" v="699" actId="20577"/>
+          <ac:spMkLst>
+            <pc:docMk/>
+            <pc:sldMk cId="4004654632" sldId="258"/>
+            <ac:spMk id="8" creationId="{AD8E64ED-BA13-4506-9D4B-0775EE33D827}"/>
+          </ac:spMkLst>
+        </pc:spChg>
+        <pc:spChg chg="mod">
+          <ac:chgData name="Fearon, Michelle" userId="a9975605-5b01-4453-b093-ebef4a050471" providerId="ADAL" clId="{D4C2BEA3-74EB-4C94-A611-476267974A9F}" dt="2023-01-26T14:14:03.317" v="796" actId="14100"/>
+          <ac:spMkLst>
+            <pc:docMk/>
+            <pc:sldMk cId="4004654632" sldId="258"/>
+            <ac:spMk id="11" creationId="{FF98DFCD-426A-4501-A258-61D745760FB4}"/>
+          </ac:spMkLst>
+        </pc:spChg>
+        <pc:spChg chg="mod">
+          <ac:chgData name="Fearon, Michelle" userId="a9975605-5b01-4453-b093-ebef4a050471" providerId="ADAL" clId="{D4C2BEA3-74EB-4C94-A611-476267974A9F}" dt="2023-01-26T14:16:24.025" v="804" actId="20577"/>
+          <ac:spMkLst>
+            <pc:docMk/>
+            <pc:sldMk cId="4004654632" sldId="258"/>
+            <ac:spMk id="13" creationId="{DA94F67D-964D-4F86-A62B-5108E0127417}"/>
+          </ac:spMkLst>
+        </pc:spChg>
+        <pc:spChg chg="mod">
+          <ac:chgData name="Fearon, Michelle" userId="a9975605-5b01-4453-b093-ebef4a050471" providerId="ADAL" clId="{D4C2BEA3-74EB-4C94-A611-476267974A9F}" dt="2023-01-26T13:31:15.862" v="674" actId="1076"/>
+          <ac:spMkLst>
+            <pc:docMk/>
+            <pc:sldMk cId="4004654632" sldId="258"/>
+            <ac:spMk id="16" creationId="{DDD67B90-6E0B-4D48-9B61-51F4377F1D8D}"/>
+          </ac:spMkLst>
+        </pc:spChg>
+        <pc:spChg chg="mod">
+          <ac:chgData name="Fearon, Michelle" userId="a9975605-5b01-4453-b093-ebef4a050471" providerId="ADAL" clId="{D4C2BEA3-74EB-4C94-A611-476267974A9F}" dt="2023-01-26T14:16:41.933" v="808" actId="1037"/>
+          <ac:spMkLst>
+            <pc:docMk/>
+            <pc:sldMk cId="4004654632" sldId="258"/>
+            <ac:spMk id="20" creationId="{8DB0FB3B-4DE5-43B2-ACA2-66F3CD9052F0}"/>
+          </ac:spMkLst>
+        </pc:spChg>
+        <pc:spChg chg="mod">
+          <ac:chgData name="Fearon, Michelle" userId="a9975605-5b01-4453-b093-ebef4a050471" providerId="ADAL" clId="{D4C2BEA3-74EB-4C94-A611-476267974A9F}" dt="2023-01-26T13:31:25.856" v="682" actId="1037"/>
+          <ac:spMkLst>
+            <pc:docMk/>
+            <pc:sldMk cId="4004654632" sldId="258"/>
+            <ac:spMk id="22" creationId="{E7735762-A518-4C77-9BFD-A20D151655CF}"/>
+          </ac:spMkLst>
+        </pc:spChg>
+        <pc:spChg chg="mod">
+          <ac:chgData name="Fearon, Michelle" userId="a9975605-5b01-4453-b093-ebef4a050471" providerId="ADAL" clId="{D4C2BEA3-74EB-4C94-A611-476267974A9F}" dt="2023-01-26T13:30:42.182" v="649" actId="20577"/>
+          <ac:spMkLst>
+            <pc:docMk/>
+            <pc:sldMk cId="4004654632" sldId="258"/>
+            <ac:spMk id="42" creationId="{C4F5877D-0070-4D4D-9D69-C71D91EFE606}"/>
+          </ac:spMkLst>
+        </pc:spChg>
+        <pc:spChg chg="mod">
+          <ac:chgData name="Fearon, Michelle" userId="a9975605-5b01-4453-b093-ebef4a050471" providerId="ADAL" clId="{D4C2BEA3-74EB-4C94-A611-476267974A9F}" dt="2023-01-26T13:30:48.251" v="659" actId="20577"/>
+          <ac:spMkLst>
+            <pc:docMk/>
+            <pc:sldMk cId="4004654632" sldId="258"/>
+            <ac:spMk id="44" creationId="{BF0AB6DB-E834-ECC0-CCD5-DABC182BD0DB}"/>
+          </ac:spMkLst>
+        </pc:spChg>
+        <pc:spChg chg="mod">
+          <ac:chgData name="Fearon, Michelle" userId="a9975605-5b01-4453-b093-ebef4a050471" providerId="ADAL" clId="{D4C2BEA3-74EB-4C94-A611-476267974A9F}" dt="2023-01-26T13:31:48.921" v="716" actId="20577"/>
+          <ac:spMkLst>
+            <pc:docMk/>
+            <pc:sldMk cId="4004654632" sldId="258"/>
+            <ac:spMk id="45" creationId="{D3CCFD88-F6D0-D0A6-6DC6-8C0B6B3DE3DB}"/>
+          </ac:spMkLst>
+        </pc:spChg>
+        <pc:spChg chg="mod">
+          <ac:chgData name="Fearon, Michelle" userId="a9975605-5b01-4453-b093-ebef4a050471" providerId="ADAL" clId="{D4C2BEA3-74EB-4C94-A611-476267974A9F}" dt="2023-01-26T14:11:31.121" v="753" actId="20577"/>
+          <ac:spMkLst>
+            <pc:docMk/>
+            <pc:sldMk cId="4004654632" sldId="258"/>
+            <ac:spMk id="47" creationId="{6304FA0E-A411-AFF3-50C2-C531B61B8DC3}"/>
+          </ac:spMkLst>
+        </pc:spChg>
+        <pc:spChg chg="mod">
+          <ac:chgData name="Fearon, Michelle" userId="a9975605-5b01-4453-b093-ebef4a050471" providerId="ADAL" clId="{D4C2BEA3-74EB-4C94-A611-476267974A9F}" dt="2023-01-26T14:13:51.368" v="794"/>
+          <ac:spMkLst>
+            <pc:docMk/>
+            <pc:sldMk cId="4004654632" sldId="258"/>
+            <ac:spMk id="50" creationId="{C55A03C0-3A9E-48C8-8F2C-EACC065A2197}"/>
+          </ac:spMkLst>
+        </pc:spChg>
+        <pc:spChg chg="mod">
+          <ac:chgData name="Fearon, Michelle" userId="a9975605-5b01-4453-b093-ebef4a050471" providerId="ADAL" clId="{D4C2BEA3-74EB-4C94-A611-476267974A9F}" dt="2023-01-26T14:10:54.763" v="739" actId="20577"/>
+          <ac:spMkLst>
+            <pc:docMk/>
+            <pc:sldMk cId="4004654632" sldId="258"/>
+            <ac:spMk id="53" creationId="{C3CF1982-E5D9-90B2-B75A-A4B5535EF15A}"/>
+          </ac:spMkLst>
+        </pc:spChg>
+        <pc:spChg chg="mod">
+          <ac:chgData name="Fearon, Michelle" userId="a9975605-5b01-4453-b093-ebef4a050471" providerId="ADAL" clId="{D4C2BEA3-74EB-4C94-A611-476267974A9F}" dt="2023-01-26T13:30:22.140" v="613"/>
+          <ac:spMkLst>
+            <pc:docMk/>
+            <pc:sldMk cId="4004654632" sldId="258"/>
+            <ac:spMk id="54" creationId="{046B4712-D180-8524-2A71-F938AF6A4B27}"/>
+          </ac:spMkLst>
+        </pc:spChg>
+        <pc:spChg chg="mod">
+          <ac:chgData name="Fearon, Michelle" userId="a9975605-5b01-4453-b093-ebef4a050471" providerId="ADAL" clId="{D4C2BEA3-74EB-4C94-A611-476267974A9F}" dt="2023-01-26T14:16:32.028" v="806" actId="1035"/>
+          <ac:spMkLst>
+            <pc:docMk/>
+            <pc:sldMk cId="4004654632" sldId="258"/>
+            <ac:spMk id="55" creationId="{18AB6F44-946B-3CF2-7D76-0E550DEEF92B}"/>
+          </ac:spMkLst>
+        </pc:spChg>
+        <pc:spChg chg="mod">
+          <ac:chgData name="Fearon, Michelle" userId="a9975605-5b01-4453-b093-ebef4a050471" providerId="ADAL" clId="{D4C2BEA3-74EB-4C94-A611-476267974A9F}" dt="2023-01-26T13:30:22.140" v="613"/>
+          <ac:spMkLst>
+            <pc:docMk/>
+            <pc:sldMk cId="4004654632" sldId="258"/>
+            <ac:spMk id="56" creationId="{0729052C-C537-ECE6-EBBF-C68659377E5A}"/>
+          </ac:spMkLst>
+        </pc:spChg>
+        <pc:spChg chg="mod">
+          <ac:chgData name="Fearon, Michelle" userId="a9975605-5b01-4453-b093-ebef4a050471" providerId="ADAL" clId="{D4C2BEA3-74EB-4C94-A611-476267974A9F}" dt="2023-01-26T14:19:27.684" v="925" actId="1076"/>
+          <ac:spMkLst>
+            <pc:docMk/>
+            <pc:sldMk cId="4004654632" sldId="258"/>
+            <ac:spMk id="61" creationId="{966EA16F-C582-3153-9447-91EFF99EC8B3}"/>
+          </ac:spMkLst>
+        </pc:spChg>
+        <pc:spChg chg="mod">
+          <ac:chgData name="Fearon, Michelle" userId="a9975605-5b01-4453-b093-ebef4a050471" providerId="ADAL" clId="{D4C2BEA3-74EB-4C94-A611-476267974A9F}" dt="2023-01-26T13:30:22.140" v="613"/>
+          <ac:spMkLst>
+            <pc:docMk/>
+            <pc:sldMk cId="4004654632" sldId="258"/>
+            <ac:spMk id="62" creationId="{C7261A61-AFAD-4FED-5D01-848E79D1F40B}"/>
+          </ac:spMkLst>
+        </pc:spChg>
+        <pc:spChg chg="mod">
+          <ac:chgData name="Fearon, Michelle" userId="a9975605-5b01-4453-b093-ebef4a050471" providerId="ADAL" clId="{D4C2BEA3-74EB-4C94-A611-476267974A9F}" dt="2023-01-26T13:30:22.140" v="613"/>
+          <ac:spMkLst>
+            <pc:docMk/>
+            <pc:sldMk cId="4004654632" sldId="258"/>
+            <ac:spMk id="64" creationId="{7295F931-E579-1015-6A19-D2FFFF9F79F1}"/>
+          </ac:spMkLst>
+        </pc:spChg>
+        <pc:spChg chg="mod">
+          <ac:chgData name="Fearon, Michelle" userId="a9975605-5b01-4453-b093-ebef4a050471" providerId="ADAL" clId="{D4C2BEA3-74EB-4C94-A611-476267974A9F}" dt="2023-01-26T14:11:41.627" v="754" actId="6549"/>
+          <ac:spMkLst>
+            <pc:docMk/>
+            <pc:sldMk cId="4004654632" sldId="258"/>
+            <ac:spMk id="65" creationId="{B24E99BA-486E-FF61-BFE9-7609A0D38240}"/>
+          </ac:spMkLst>
+        </pc:spChg>
+        <pc:spChg chg="mod">
+          <ac:chgData name="Fearon, Michelle" userId="a9975605-5b01-4453-b093-ebef4a050471" providerId="ADAL" clId="{D4C2BEA3-74EB-4C94-A611-476267974A9F}" dt="2023-01-26T13:30:22.140" v="613"/>
+          <ac:spMkLst>
+            <pc:docMk/>
+            <pc:sldMk cId="4004654632" sldId="258"/>
+            <ac:spMk id="66" creationId="{3A42D8C9-C9CB-2E8C-232E-A889EE8CE967}"/>
+          </ac:spMkLst>
+        </pc:spChg>
+        <pc:spChg chg="mod">
+          <ac:chgData name="Fearon, Michelle" userId="a9975605-5b01-4453-b093-ebef4a050471" providerId="ADAL" clId="{D4C2BEA3-74EB-4C94-A611-476267974A9F}" dt="2023-01-26T13:30:22.140" v="613"/>
+          <ac:spMkLst>
+            <pc:docMk/>
+            <pc:sldMk cId="4004654632" sldId="258"/>
+            <ac:spMk id="68" creationId="{9DED061C-C859-9A35-027C-0E4481F7F340}"/>
+          </ac:spMkLst>
+        </pc:spChg>
+        <pc:spChg chg="mod">
+          <ac:chgData name="Fearon, Michelle" userId="a9975605-5b01-4453-b093-ebef4a050471" providerId="ADAL" clId="{D4C2BEA3-74EB-4C94-A611-476267974A9F}" dt="2023-01-26T13:30:22.140" v="613"/>
+          <ac:spMkLst>
+            <pc:docMk/>
+            <pc:sldMk cId="4004654632" sldId="258"/>
+            <ac:spMk id="69" creationId="{6AE45A5C-A698-1651-0E19-F6DF6ABE5202}"/>
+          </ac:spMkLst>
+        </pc:spChg>
+        <pc:spChg chg="mod">
+          <ac:chgData name="Fearon, Michelle" userId="a9975605-5b01-4453-b093-ebef4a050471" providerId="ADAL" clId="{D4C2BEA3-74EB-4C94-A611-476267974A9F}" dt="2023-01-26T13:30:22.140" v="613"/>
+          <ac:spMkLst>
+            <pc:docMk/>
+            <pc:sldMk cId="4004654632" sldId="258"/>
+            <ac:spMk id="70" creationId="{4B00EBE4-804F-19A6-DD9B-63DEE8B633DD}"/>
+          </ac:spMkLst>
+        </pc:spChg>
+        <pc:spChg chg="mod">
+          <ac:chgData name="Fearon, Michelle" userId="a9975605-5b01-4453-b093-ebef4a050471" providerId="ADAL" clId="{D4C2BEA3-74EB-4C94-A611-476267974A9F}" dt="2023-01-26T13:30:22.140" v="613"/>
+          <ac:spMkLst>
+            <pc:docMk/>
+            <pc:sldMk cId="4004654632" sldId="258"/>
+            <ac:spMk id="71" creationId="{80C546D6-5CE3-96B2-8C43-2B624D536E61}"/>
+          </ac:spMkLst>
+        </pc:spChg>
+        <pc:spChg chg="add mod">
+          <ac:chgData name="Fearon, Michelle" userId="a9975605-5b01-4453-b093-ebef4a050471" providerId="ADAL" clId="{D4C2BEA3-74EB-4C94-A611-476267974A9F}" dt="2023-01-26T14:19:54.022" v="934" actId="14100"/>
+          <ac:spMkLst>
+            <pc:docMk/>
+            <pc:sldMk cId="4004654632" sldId="258"/>
+            <ac:spMk id="88" creationId="{2090C9A7-D207-6274-37D9-33EB668A6A94}"/>
+          </ac:spMkLst>
+        </pc:spChg>
+        <pc:grpChg chg="add mod">
+          <ac:chgData name="Fearon, Michelle" userId="a9975605-5b01-4453-b093-ebef4a050471" providerId="ADAL" clId="{D4C2BEA3-74EB-4C94-A611-476267974A9F}" dt="2023-01-26T14:17:46.103" v="862" actId="1038"/>
+          <ac:grpSpMkLst>
+            <pc:docMk/>
+            <pc:sldMk cId="4004654632" sldId="258"/>
+            <ac:grpSpMk id="2" creationId="{6AEBE224-2ACC-6665-2C05-4022C9CD99D4}"/>
+          </ac:grpSpMkLst>
+        </pc:grpChg>
+        <pc:grpChg chg="mod">
+          <ac:chgData name="Fearon, Michelle" userId="a9975605-5b01-4453-b093-ebef4a050471" providerId="ADAL" clId="{D4C2BEA3-74EB-4C94-A611-476267974A9F}" dt="2023-01-26T13:30:22.140" v="613"/>
+          <ac:grpSpMkLst>
+            <pc:docMk/>
+            <pc:sldMk cId="4004654632" sldId="258"/>
+            <ac:grpSpMk id="3" creationId="{20746761-E1B0-32DD-5F5A-9EFE6BECF351}"/>
+          </ac:grpSpMkLst>
+        </pc:grpChg>
+        <pc:grpChg chg="mod">
+          <ac:chgData name="Fearon, Michelle" userId="a9975605-5b01-4453-b093-ebef4a050471" providerId="ADAL" clId="{D4C2BEA3-74EB-4C94-A611-476267974A9F}" dt="2023-01-26T13:30:12.052" v="612" actId="1037"/>
+          <ac:grpSpMkLst>
+            <pc:docMk/>
+            <pc:sldMk cId="4004654632" sldId="258"/>
+            <ac:grpSpMk id="59" creationId="{3D412982-0401-10F5-AF91-97953CC609F8}"/>
+          </ac:grpSpMkLst>
+        </pc:grpChg>
+        <pc:grpChg chg="del">
+          <ac:chgData name="Fearon, Michelle" userId="a9975605-5b01-4453-b093-ebef4a050471" providerId="ADAL" clId="{D4C2BEA3-74EB-4C94-A611-476267974A9F}" dt="2023-01-26T13:29:59.179" v="516" actId="478"/>
+          <ac:grpSpMkLst>
+            <pc:docMk/>
+            <pc:sldMk cId="4004654632" sldId="258"/>
+            <ac:grpSpMk id="60" creationId="{C384E187-08BC-999E-B971-B4E242C38CBE}"/>
+          </ac:grpSpMkLst>
+        </pc:grpChg>
+        <pc:cxnChg chg="del">
+          <ac:chgData name="Fearon, Michelle" userId="a9975605-5b01-4453-b093-ebef4a050471" providerId="ADAL" clId="{D4C2BEA3-74EB-4C94-A611-476267974A9F}" dt="2023-01-26T14:14:09.590" v="797" actId="478"/>
+          <ac:cxnSpMkLst>
+            <pc:docMk/>
+            <pc:sldMk cId="4004654632" sldId="258"/>
+            <ac:cxnSpMk id="10" creationId="{E59911E8-FEC9-40CF-806B-46ABB90E6018}"/>
+          </ac:cxnSpMkLst>
+        </pc:cxnChg>
+        <pc:cxnChg chg="mod">
+          <ac:chgData name="Fearon, Michelle" userId="a9975605-5b01-4453-b093-ebef4a050471" providerId="ADAL" clId="{D4C2BEA3-74EB-4C94-A611-476267974A9F}" dt="2023-01-26T13:31:15.862" v="674" actId="1076"/>
+          <ac:cxnSpMkLst>
+            <pc:docMk/>
+            <pc:sldMk cId="4004654632" sldId="258"/>
+            <ac:cxnSpMk id="18" creationId="{9B3249B0-1F65-4781-8726-D3B07A69B383}"/>
+          </ac:cxnSpMkLst>
+        </pc:cxnChg>
+        <pc:cxnChg chg="mod">
+          <ac:chgData name="Fearon, Michelle" userId="a9975605-5b01-4453-b093-ebef4a050471" providerId="ADAL" clId="{D4C2BEA3-74EB-4C94-A611-476267974A9F}" dt="2023-01-26T14:08:01.295" v="726" actId="692"/>
+          <ac:cxnSpMkLst>
+            <pc:docMk/>
+            <pc:sldMk cId="4004654632" sldId="258"/>
+            <ac:cxnSpMk id="25" creationId="{BB137E5C-0503-406F-8E44-7F160ABB0842}"/>
+          </ac:cxnSpMkLst>
+        </pc:cxnChg>
+        <pc:cxnChg chg="mod">
+          <ac:chgData name="Fearon, Michelle" userId="a9975605-5b01-4453-b093-ebef4a050471" providerId="ADAL" clId="{D4C2BEA3-74EB-4C94-A611-476267974A9F}" dt="2023-01-26T13:29:59.179" v="516" actId="478"/>
+          <ac:cxnSpMkLst>
+            <pc:docMk/>
+            <pc:sldMk cId="4004654632" sldId="258"/>
+            <ac:cxnSpMk id="35" creationId="{2593188B-A877-4B56-9BF4-3F3E7480A50D}"/>
+          </ac:cxnSpMkLst>
+        </pc:cxnChg>
+        <pc:cxnChg chg="mod">
+          <ac:chgData name="Fearon, Michelle" userId="a9975605-5b01-4453-b093-ebef4a050471" providerId="ADAL" clId="{D4C2BEA3-74EB-4C94-A611-476267974A9F}" dt="2023-01-26T13:29:59.179" v="516" actId="478"/>
+          <ac:cxnSpMkLst>
+            <pc:docMk/>
+            <pc:sldMk cId="4004654632" sldId="258"/>
+            <ac:cxnSpMk id="37" creationId="{84044A88-6F5F-44CB-B02C-0E6DB2BA6D71}"/>
+          </ac:cxnSpMkLst>
+        </pc:cxnChg>
+        <pc:cxnChg chg="mod">
+          <ac:chgData name="Fearon, Michelle" userId="a9975605-5b01-4453-b093-ebef4a050471" providerId="ADAL" clId="{D4C2BEA3-74EB-4C94-A611-476267974A9F}" dt="2023-01-26T13:29:59.179" v="516" actId="478"/>
+          <ac:cxnSpMkLst>
+            <pc:docMk/>
+            <pc:sldMk cId="4004654632" sldId="258"/>
+            <ac:cxnSpMk id="39" creationId="{172CEB65-2529-4830-9C5A-02EAEE1E4C5F}"/>
+          </ac:cxnSpMkLst>
+        </pc:cxnChg>
+        <pc:cxnChg chg="mod">
+          <ac:chgData name="Fearon, Michelle" userId="a9975605-5b01-4453-b093-ebef4a050471" providerId="ADAL" clId="{D4C2BEA3-74EB-4C94-A611-476267974A9F}" dt="2023-01-26T14:07:19.887" v="724" actId="692"/>
+          <ac:cxnSpMkLst>
+            <pc:docMk/>
+            <pc:sldMk cId="4004654632" sldId="258"/>
+            <ac:cxnSpMk id="46" creationId="{00F5EE8B-9F53-7435-7FDE-3649BA539202}"/>
+          </ac:cxnSpMkLst>
+        </pc:cxnChg>
+        <pc:cxnChg chg="mod">
+          <ac:chgData name="Fearon, Michelle" userId="a9975605-5b01-4453-b093-ebef4a050471" providerId="ADAL" clId="{D4C2BEA3-74EB-4C94-A611-476267974A9F}" dt="2023-01-26T14:08:04.346" v="727" actId="692"/>
+          <ac:cxnSpMkLst>
+            <pc:docMk/>
+            <pc:sldMk cId="4004654632" sldId="258"/>
+            <ac:cxnSpMk id="48" creationId="{9BE7C736-6937-7EE1-0A4F-31B37E520BD5}"/>
+          </ac:cxnSpMkLst>
+        </pc:cxnChg>
+        <pc:cxnChg chg="mod">
+          <ac:chgData name="Fearon, Michelle" userId="a9975605-5b01-4453-b093-ebef4a050471" providerId="ADAL" clId="{D4C2BEA3-74EB-4C94-A611-476267974A9F}" dt="2023-01-26T13:30:22.140" v="613"/>
+          <ac:cxnSpMkLst>
+            <pc:docMk/>
+            <pc:sldMk cId="4004654632" sldId="258"/>
+            <ac:cxnSpMk id="49" creationId="{2BA57666-4679-2F0B-032F-00595EC0C88A}"/>
+          </ac:cxnSpMkLst>
+        </pc:cxnChg>
+        <pc:cxnChg chg="mod">
+          <ac:chgData name="Fearon, Michelle" userId="a9975605-5b01-4453-b093-ebef4a050471" providerId="ADAL" clId="{D4C2BEA3-74EB-4C94-A611-476267974A9F}" dt="2023-01-26T13:30:22.140" v="613"/>
+          <ac:cxnSpMkLst>
+            <pc:docMk/>
+            <pc:sldMk cId="4004654632" sldId="258"/>
+            <ac:cxnSpMk id="51" creationId="{1C200EDC-EF95-A0D1-5195-7E4BC3E1D595}"/>
+          </ac:cxnSpMkLst>
+        </pc:cxnChg>
+        <pc:cxnChg chg="mod">
+          <ac:chgData name="Fearon, Michelle" userId="a9975605-5b01-4453-b093-ebef4a050471" providerId="ADAL" clId="{D4C2BEA3-74EB-4C94-A611-476267974A9F}" dt="2023-01-26T14:07:15.640" v="723" actId="692"/>
+          <ac:cxnSpMkLst>
+            <pc:docMk/>
+            <pc:sldMk cId="4004654632" sldId="258"/>
+            <ac:cxnSpMk id="52" creationId="{9158906F-E1E0-0BB8-7515-B69B021EBF46}"/>
+          </ac:cxnSpMkLst>
+        </pc:cxnChg>
+        <pc:cxnChg chg="mod">
+          <ac:chgData name="Fearon, Michelle" userId="a9975605-5b01-4453-b093-ebef4a050471" providerId="ADAL" clId="{D4C2BEA3-74EB-4C94-A611-476267974A9F}" dt="2023-01-26T13:30:22.140" v="613"/>
+          <ac:cxnSpMkLst>
+            <pc:docMk/>
+            <pc:sldMk cId="4004654632" sldId="258"/>
+            <ac:cxnSpMk id="57" creationId="{2062D936-AE24-403B-F205-0EA6124D1C36}"/>
+          </ac:cxnSpMkLst>
+        </pc:cxnChg>
+        <pc:cxnChg chg="mod">
+          <ac:chgData name="Fearon, Michelle" userId="a9975605-5b01-4453-b093-ebef4a050471" providerId="ADAL" clId="{D4C2BEA3-74EB-4C94-A611-476267974A9F}" dt="2023-01-26T14:19:27.684" v="925" actId="1076"/>
+          <ac:cxnSpMkLst>
+            <pc:docMk/>
+            <pc:sldMk cId="4004654632" sldId="258"/>
+            <ac:cxnSpMk id="63" creationId="{57CDD9AC-B812-04D5-2496-69FD41728968}"/>
+          </ac:cxnSpMkLst>
+        </pc:cxnChg>
+        <pc:cxnChg chg="mod">
+          <ac:chgData name="Fearon, Michelle" userId="a9975605-5b01-4453-b093-ebef4a050471" providerId="ADAL" clId="{D4C2BEA3-74EB-4C94-A611-476267974A9F}" dt="2023-01-26T13:30:22.140" v="613"/>
+          <ac:cxnSpMkLst>
+            <pc:docMk/>
+            <pc:sldMk cId="4004654632" sldId="258"/>
+            <ac:cxnSpMk id="67" creationId="{7E8AF326-549F-6D33-E40A-B3021987818C}"/>
+          </ac:cxnSpMkLst>
+        </pc:cxnChg>
+        <pc:cxnChg chg="add mod">
+          <ac:chgData name="Fearon, Michelle" userId="a9975605-5b01-4453-b093-ebef4a050471" providerId="ADAL" clId="{D4C2BEA3-74EB-4C94-A611-476267974A9F}" dt="2023-01-26T14:14:20.057" v="799" actId="1076"/>
+          <ac:cxnSpMkLst>
+            <pc:docMk/>
+            <pc:sldMk cId="4004654632" sldId="258"/>
+            <ac:cxnSpMk id="75" creationId="{B7FFE2B0-272D-CA1E-8A5E-290956DFA4D4}"/>
+          </ac:cxnSpMkLst>
+        </pc:cxnChg>
+        <pc:cxnChg chg="add mod">
+          <ac:chgData name="Fearon, Michelle" userId="a9975605-5b01-4453-b093-ebef4a050471" providerId="ADAL" clId="{D4C2BEA3-74EB-4C94-A611-476267974A9F}" dt="2023-01-26T14:19:20.094" v="924" actId="14100"/>
+          <ac:cxnSpMkLst>
+            <pc:docMk/>
+            <pc:sldMk cId="4004654632" sldId="258"/>
+            <ac:cxnSpMk id="76" creationId="{7E957F69-2AFD-A3F6-D324-AD7B4C58E224}"/>
           </ac:cxnSpMkLst>
         </pc:cxnChg>
       </pc:sldChg>
@@ -832,7 +1216,7 @@
           <a:p>
             <a:fld id="{56302F90-7EFD-49D0-85A6-435CC668CCE4}" type="datetimeFigureOut">
               <a:rPr lang="en-US" smtClean="0"/>
-              <a:t>1/19/2023</a:t>
+              <a:t>1/26/2023</a:t>
             </a:fld>
             <a:endParaRPr lang="en-US"/>
           </a:p>
@@ -1030,7 +1414,7 @@
           <a:p>
             <a:fld id="{56302F90-7EFD-49D0-85A6-435CC668CCE4}" type="datetimeFigureOut">
               <a:rPr lang="en-US" smtClean="0"/>
-              <a:t>1/19/2023</a:t>
+              <a:t>1/26/2023</a:t>
             </a:fld>
             <a:endParaRPr lang="en-US"/>
           </a:p>
@@ -1238,7 +1622,7 @@
           <a:p>
             <a:fld id="{56302F90-7EFD-49D0-85A6-435CC668CCE4}" type="datetimeFigureOut">
               <a:rPr lang="en-US" smtClean="0"/>
-              <a:t>1/19/2023</a:t>
+              <a:t>1/26/2023</a:t>
             </a:fld>
             <a:endParaRPr lang="en-US"/>
           </a:p>
@@ -1436,7 +1820,7 @@
           <a:p>
             <a:fld id="{56302F90-7EFD-49D0-85A6-435CC668CCE4}" type="datetimeFigureOut">
               <a:rPr lang="en-US" smtClean="0"/>
-              <a:t>1/19/2023</a:t>
+              <a:t>1/26/2023</a:t>
             </a:fld>
             <a:endParaRPr lang="en-US"/>
           </a:p>
@@ -1711,7 +2095,7 @@
           <a:p>
             <a:fld id="{56302F90-7EFD-49D0-85A6-435CC668CCE4}" type="datetimeFigureOut">
               <a:rPr lang="en-US" smtClean="0"/>
-              <a:t>1/19/2023</a:t>
+              <a:t>1/26/2023</a:t>
             </a:fld>
             <a:endParaRPr lang="en-US"/>
           </a:p>
@@ -1976,7 +2360,7 @@
           <a:p>
             <a:fld id="{56302F90-7EFD-49D0-85A6-435CC668CCE4}" type="datetimeFigureOut">
               <a:rPr lang="en-US" smtClean="0"/>
-              <a:t>1/19/2023</a:t>
+              <a:t>1/26/2023</a:t>
             </a:fld>
             <a:endParaRPr lang="en-US"/>
           </a:p>
@@ -2388,7 +2772,7 @@
           <a:p>
             <a:fld id="{56302F90-7EFD-49D0-85A6-435CC668CCE4}" type="datetimeFigureOut">
               <a:rPr lang="en-US" smtClean="0"/>
-              <a:t>1/19/2023</a:t>
+              <a:t>1/26/2023</a:t>
             </a:fld>
             <a:endParaRPr lang="en-US"/>
           </a:p>
@@ -2529,7 +2913,7 @@
           <a:p>
             <a:fld id="{56302F90-7EFD-49D0-85A6-435CC668CCE4}" type="datetimeFigureOut">
               <a:rPr lang="en-US" smtClean="0"/>
-              <a:t>1/19/2023</a:t>
+              <a:t>1/26/2023</a:t>
             </a:fld>
             <a:endParaRPr lang="en-US"/>
           </a:p>
@@ -2642,7 +3026,7 @@
           <a:p>
             <a:fld id="{56302F90-7EFD-49D0-85A6-435CC668CCE4}" type="datetimeFigureOut">
               <a:rPr lang="en-US" smtClean="0"/>
-              <a:t>1/19/2023</a:t>
+              <a:t>1/26/2023</a:t>
             </a:fld>
             <a:endParaRPr lang="en-US"/>
           </a:p>
@@ -2953,7 +3337,7 @@
           <a:p>
             <a:fld id="{56302F90-7EFD-49D0-85A6-435CC668CCE4}" type="datetimeFigureOut">
               <a:rPr lang="en-US" smtClean="0"/>
-              <a:t>1/19/2023</a:t>
+              <a:t>1/26/2023</a:t>
             </a:fld>
             <a:endParaRPr lang="en-US"/>
           </a:p>
@@ -3241,7 +3625,7 @@
           <a:p>
             <a:fld id="{56302F90-7EFD-49D0-85A6-435CC668CCE4}" type="datetimeFigureOut">
               <a:rPr lang="en-US" smtClean="0"/>
-              <a:t>1/19/2023</a:t>
+              <a:t>1/26/2023</a:t>
             </a:fld>
             <a:endParaRPr lang="en-US"/>
           </a:p>
@@ -3482,7 +3866,7 @@
           <a:p>
             <a:fld id="{56302F90-7EFD-49D0-85A6-435CC668CCE4}" type="datetimeFigureOut">
               <a:rPr lang="en-US" smtClean="0"/>
-              <a:t>1/19/2023</a:t>
+              <a:t>1/26/2023</a:t>
             </a:fld>
             <a:endParaRPr lang="en-US"/>
           </a:p>
@@ -4493,8 +4877,8 @@
                   <a:t>(edible chlorophyll </a:t>
                 </a:r>
                 <a:r>
-                  <a:rPr lang="el-GR" dirty="0"/>
-                  <a:t>α</a:t>
+                  <a:rPr lang="en-US" i="1" dirty="0"/>
+                  <a:t>a</a:t>
                 </a:r>
                 <a:r>
                   <a:rPr lang="en-US" dirty="0"/>
@@ -5016,7 +5400,7 @@
               </p:nvSpPr>
               <p:spPr>
                 <a:xfrm>
-                  <a:off x="3546982" y="3765045"/>
+                  <a:off x="3806811" y="3753891"/>
                   <a:ext cx="838456" cy="307777"/>
                 </a:xfrm>
                 <a:prstGeom prst="rect">
@@ -5521,8 +5905,8 @@
                     <a:schemeClr val="tx1"/>
                   </a:solidFill>
                   <a:prstDash val="sysDot"/>
-                  <a:headEnd type="triangle"/>
-                  <a:tailEnd type="triangle"/>
+                  <a:headEnd type="triangle" w="lg" len="lg"/>
+                  <a:tailEnd type="triangle" w="lg" len="lg"/>
                 </a:ln>
               </p:spPr>
               <p:style>
@@ -5588,8 +5972,8 @@
                     <a:t>(edible chlorophyll </a:t>
                   </a:r>
                   <a:r>
-                    <a:rPr lang="el-GR" dirty="0"/>
-                    <a:t>α</a:t>
+                    <a:rPr lang="en-US" i="1" dirty="0"/>
+                    <a:t>a</a:t>
                   </a:r>
                   <a:r>
                     <a:rPr lang="en-US" dirty="0"/>
@@ -5670,7 +6054,7 @@
               </a:prstGeom>
               <a:ln w="38100">
                 <a:prstDash val="sysDot"/>
-                <a:tailEnd type="triangle"/>
+                <a:tailEnd type="triangle" w="lg" len="lg"/>
               </a:ln>
             </p:spPr>
             <p:style>
@@ -5918,8 +6302,8 @@
                   <a:t>(edible chlorophyll </a:t>
                 </a:r>
                 <a:r>
-                  <a:rPr lang="el-GR" dirty="0"/>
-                  <a:t>α</a:t>
+                  <a:rPr lang="en-US" i="1" dirty="0"/>
+                  <a:t>a</a:t>
                 </a:r>
                 <a:r>
                   <a:rPr lang="en-US" dirty="0"/>
@@ -6465,8 +6849,8 @@
                   <a:schemeClr val="tx1"/>
                 </a:solidFill>
                 <a:prstDash val="solid"/>
-                <a:headEnd type="triangle"/>
-                <a:tailEnd type="triangle"/>
+                <a:headEnd type="triangle" w="lg" len="lg"/>
+                <a:tailEnd type="triangle" w="lg" len="lg"/>
               </a:ln>
             </p:spPr>
             <p:style>
@@ -7367,16 +7751,21 @@
                 <a:pPr algn="ctr"/>
                 <a:r>
                   <a:rPr lang="en-US" dirty="0"/>
-                  <a:t>(edible chlorophyll </a:t>
+                  <a:t>(edible </a:t>
                 </a:r>
                 <a:r>
-                  <a:rPr lang="el-GR" dirty="0"/>
-                  <a:t>α</a:t>
+                  <a:rPr lang="en-US"/>
+                  <a:t>chlorophyll </a:t>
                 </a:r>
                 <a:r>
-                  <a:rPr lang="en-US" dirty="0"/>
+                  <a:rPr lang="en-US" i="1"/>
+                  <a:t>a</a:t>
+                </a:r>
+                <a:r>
+                  <a:rPr lang="en-US"/>
                   <a:t>)</a:t>
                 </a:r>
+                <a:endParaRPr lang="en-US" dirty="0"/>
               </a:p>
             </p:txBody>
           </p:sp>
@@ -7501,7 +7890,7 @@
             </a:prstGeom>
             <a:ln w="38100">
               <a:prstDash val="sysDot"/>
-              <a:tailEnd type="triangle"/>
+              <a:tailEnd type="triangle" w="lg" len="lg"/>
             </a:ln>
           </p:spPr>
           <p:style>
@@ -7560,6 +7949,2287 @@
     <p:extLst>
       <p:ext uri="{BB962C8B-B14F-4D97-AF65-F5344CB8AC3E}">
         <p14:creationId xmlns:p14="http://schemas.microsoft.com/office/powerpoint/2010/main" val="858079376"/>
+      </p:ext>
+    </p:extLst>
+  </p:cSld>
+  <p:clrMapOvr>
+    <a:masterClrMapping/>
+  </p:clrMapOvr>
+</p:sld>
+</file>
+
+<file path=ppt/slides/slide3.xml><?xml version="1.0" encoding="utf-8"?>
+<p:sld xmlns:a="http://schemas.openxmlformats.org/drawingml/2006/main" xmlns:r="http://schemas.openxmlformats.org/officeDocument/2006/relationships" xmlns:p="http://schemas.openxmlformats.org/presentationml/2006/main">
+  <p:cSld>
+    <p:spTree>
+      <p:nvGrpSpPr>
+        <p:cNvPr id="1" name=""/>
+        <p:cNvGrpSpPr/>
+        <p:nvPr/>
+      </p:nvGrpSpPr>
+      <p:grpSpPr>
+        <a:xfrm>
+          <a:off x="0" y="0"/>
+          <a:ext cx="0" cy="0"/>
+          <a:chOff x="0" y="0"/>
+          <a:chExt cx="0" cy="0"/>
+        </a:xfrm>
+      </p:grpSpPr>
+      <p:grpSp>
+        <p:nvGrpSpPr>
+          <p:cNvPr id="59" name="Group 58">
+            <a:extLst>
+              <a:ext uri="{FF2B5EF4-FFF2-40B4-BE49-F238E27FC236}">
+                <a16:creationId xmlns:a16="http://schemas.microsoft.com/office/drawing/2014/main" id="{3D412982-0401-10F5-AF91-97953CC609F8}"/>
+              </a:ext>
+            </a:extLst>
+          </p:cNvPr>
+          <p:cNvGrpSpPr/>
+          <p:nvPr/>
+        </p:nvGrpSpPr>
+        <p:grpSpPr>
+          <a:xfrm>
+            <a:off x="202050" y="252295"/>
+            <a:ext cx="5447238" cy="5151368"/>
+            <a:chOff x="693274" y="1106001"/>
+            <a:chExt cx="5447238" cy="5151368"/>
+          </a:xfrm>
+        </p:grpSpPr>
+        <p:sp>
+          <p:nvSpPr>
+            <p:cNvPr id="42" name="TextBox 41">
+              <a:extLst>
+                <a:ext uri="{FF2B5EF4-FFF2-40B4-BE49-F238E27FC236}">
+                  <a16:creationId xmlns:a16="http://schemas.microsoft.com/office/drawing/2014/main" id="{C4F5877D-0070-4D4D-9D69-C71D91EFE606}"/>
+                </a:ext>
+              </a:extLst>
+            </p:cNvPr>
+            <p:cNvSpPr txBox="1"/>
+            <p:nvPr/>
+          </p:nvSpPr>
+          <p:spPr>
+            <a:xfrm>
+              <a:off x="693274" y="1106001"/>
+              <a:ext cx="3754536" cy="369332"/>
+            </a:xfrm>
+            <a:prstGeom prst="rect">
+              <a:avLst/>
+            </a:prstGeom>
+            <a:noFill/>
+          </p:spPr>
+          <p:txBody>
+            <a:bodyPr wrap="square" rtlCol="0">
+              <a:spAutoFit/>
+            </a:bodyPr>
+            <a:lstStyle/>
+            <a:p>
+              <a:r>
+                <a:rPr lang="en-US" b="1" dirty="0"/>
+                <a:t>a. </a:t>
+              </a:r>
+              <a:r>
+                <a:rPr lang="en-US" sz="1800" b="1" i="0" u="none" strike="noStrike" dirty="0">
+                  <a:solidFill>
+                    <a:srgbClr val="000000"/>
+                  </a:solidFill>
+                  <a:effectLst/>
+                </a:rPr>
+                <a:t>Parasite with TP</a:t>
+              </a:r>
+              <a:endParaRPr lang="en-US" b="1" dirty="0"/>
+            </a:p>
+          </p:txBody>
+        </p:sp>
+        <p:grpSp>
+          <p:nvGrpSpPr>
+            <p:cNvPr id="58" name="Group 57">
+              <a:extLst>
+                <a:ext uri="{FF2B5EF4-FFF2-40B4-BE49-F238E27FC236}">
+                  <a16:creationId xmlns:a16="http://schemas.microsoft.com/office/drawing/2014/main" id="{68490846-BBAA-F4D2-8615-F8B0CA2817FF}"/>
+                </a:ext>
+              </a:extLst>
+            </p:cNvPr>
+            <p:cNvGrpSpPr/>
+            <p:nvPr/>
+          </p:nvGrpSpPr>
+          <p:grpSpPr>
+            <a:xfrm>
+              <a:off x="693274" y="1700828"/>
+              <a:ext cx="5447238" cy="4556541"/>
+              <a:chOff x="693274" y="1700828"/>
+              <a:chExt cx="5447238" cy="4556541"/>
+            </a:xfrm>
+          </p:grpSpPr>
+          <p:grpSp>
+            <p:nvGrpSpPr>
+              <p:cNvPr id="26" name="Group 25">
+                <a:extLst>
+                  <a:ext uri="{FF2B5EF4-FFF2-40B4-BE49-F238E27FC236}">
+                    <a16:creationId xmlns:a16="http://schemas.microsoft.com/office/drawing/2014/main" id="{9C1C81B2-8ECF-457A-8C3C-106111BC7B38}"/>
+                  </a:ext>
+                </a:extLst>
+              </p:cNvPr>
+              <p:cNvGrpSpPr/>
+              <p:nvPr/>
+            </p:nvGrpSpPr>
+            <p:grpSpPr>
+              <a:xfrm>
+                <a:off x="693274" y="1700828"/>
+                <a:ext cx="5350432" cy="4556541"/>
+                <a:chOff x="435822" y="3112377"/>
+                <a:chExt cx="5350432" cy="4556541"/>
+              </a:xfrm>
+            </p:grpSpPr>
+            <p:sp>
+              <p:nvSpPr>
+                <p:cNvPr id="4" name="TextBox 3">
+                  <a:extLst>
+                    <a:ext uri="{FF2B5EF4-FFF2-40B4-BE49-F238E27FC236}">
+                      <a16:creationId xmlns:a16="http://schemas.microsoft.com/office/drawing/2014/main" id="{B5EDE396-DD2F-4D22-B351-5743AC6035F2}"/>
+                    </a:ext>
+                  </a:extLst>
+                </p:cNvPr>
+                <p:cNvSpPr txBox="1"/>
+                <p:nvPr/>
+              </p:nvSpPr>
+              <p:spPr>
+                <a:xfrm>
+                  <a:off x="2428616" y="4427147"/>
+                  <a:ext cx="1924491" cy="369332"/>
+                </a:xfrm>
+                <a:prstGeom prst="rect">
+                  <a:avLst/>
+                </a:prstGeom>
+                <a:noFill/>
+                <a:ln>
+                  <a:solidFill>
+                    <a:schemeClr val="tx1"/>
+                  </a:solidFill>
+                </a:ln>
+              </p:spPr>
+              <p:txBody>
+                <a:bodyPr wrap="square" rtlCol="0">
+                  <a:spAutoFit/>
+                </a:bodyPr>
+                <a:lstStyle/>
+                <a:p>
+                  <a:pPr algn="ctr"/>
+                  <a:r>
+                    <a:rPr lang="en-US" dirty="0"/>
+                    <a:t>Total host density</a:t>
+                  </a:r>
+                </a:p>
+              </p:txBody>
+            </p:sp>
+            <p:cxnSp>
+              <p:nvCxnSpPr>
+                <p:cNvPr id="6" name="Straight Arrow Connector 5">
+                  <a:extLst>
+                    <a:ext uri="{FF2B5EF4-FFF2-40B4-BE49-F238E27FC236}">
+                      <a16:creationId xmlns:a16="http://schemas.microsoft.com/office/drawing/2014/main" id="{922AB8B3-8035-44BC-ADC8-58130B9459EF}"/>
+                    </a:ext>
+                  </a:extLst>
+                </p:cNvPr>
+                <p:cNvCxnSpPr>
+                  <a:cxnSpLocks/>
+                </p:cNvCxnSpPr>
+                <p:nvPr/>
+              </p:nvCxnSpPr>
+              <p:spPr>
+                <a:xfrm flipV="1">
+                  <a:off x="3380227" y="4807481"/>
+                  <a:ext cx="0" cy="675852"/>
+                </a:xfrm>
+                <a:prstGeom prst="straightConnector1">
+                  <a:avLst/>
+                </a:prstGeom>
+                <a:ln w="38100">
+                  <a:solidFill>
+                    <a:schemeClr val="tx1"/>
+                  </a:solidFill>
+                  <a:prstDash val="sysDot"/>
+                  <a:tailEnd type="triangle" w="lg" len="lg"/>
+                </a:ln>
+              </p:spPr>
+              <p:style>
+                <a:lnRef idx="1">
+                  <a:schemeClr val="accent1"/>
+                </a:lnRef>
+                <a:fillRef idx="0">
+                  <a:schemeClr val="accent1"/>
+                </a:fillRef>
+                <a:effectRef idx="0">
+                  <a:schemeClr val="accent1"/>
+                </a:effectRef>
+                <a:fontRef idx="minor">
+                  <a:schemeClr val="tx1"/>
+                </a:fontRef>
+              </p:style>
+            </p:cxnSp>
+            <p:sp>
+              <p:nvSpPr>
+                <p:cNvPr id="8" name="TextBox 7">
+                  <a:extLst>
+                    <a:ext uri="{FF2B5EF4-FFF2-40B4-BE49-F238E27FC236}">
+                      <a16:creationId xmlns:a16="http://schemas.microsoft.com/office/drawing/2014/main" id="{AD8E64ED-BA13-4506-9D4B-0775EE33D827}"/>
+                    </a:ext>
+                  </a:extLst>
+                </p:cNvPr>
+                <p:cNvSpPr txBox="1"/>
+                <p:nvPr/>
+              </p:nvSpPr>
+              <p:spPr>
+                <a:xfrm>
+                  <a:off x="2180944" y="3122117"/>
+                  <a:ext cx="2368337" cy="646331"/>
+                </a:xfrm>
+                <a:prstGeom prst="rect">
+                  <a:avLst/>
+                </a:prstGeom>
+                <a:noFill/>
+                <a:ln>
+                  <a:solidFill>
+                    <a:schemeClr val="tx1"/>
+                  </a:solidFill>
+                </a:ln>
+              </p:spPr>
+              <p:txBody>
+                <a:bodyPr wrap="square" rtlCol="0">
+                  <a:spAutoFit/>
+                </a:bodyPr>
+                <a:lstStyle/>
+                <a:p>
+                  <a:pPr algn="ctr"/>
+                  <a:r>
+                    <a:rPr lang="en-US" dirty="0"/>
+                    <a:t>Epidemic size </a:t>
+                  </a:r>
+                </a:p>
+                <a:p>
+                  <a:pPr algn="ctr"/>
+                  <a:r>
+                    <a:rPr lang="en-US" dirty="0"/>
+                    <a:t>(infection prevalence)</a:t>
+                  </a:r>
+                </a:p>
+              </p:txBody>
+            </p:sp>
+            <p:cxnSp>
+              <p:nvCxnSpPr>
+                <p:cNvPr id="9" name="Straight Arrow Connector 8">
+                  <a:extLst>
+                    <a:ext uri="{FF2B5EF4-FFF2-40B4-BE49-F238E27FC236}">
+                      <a16:creationId xmlns:a16="http://schemas.microsoft.com/office/drawing/2014/main" id="{7298B348-FB8A-4B5F-B28E-8D4DE9326A92}"/>
+                    </a:ext>
+                  </a:extLst>
+                </p:cNvPr>
+                <p:cNvCxnSpPr>
+                  <a:cxnSpLocks/>
+                  <a:stCxn id="7" idx="3"/>
+                  <a:endCxn id="8" idx="1"/>
+                </p:cNvCxnSpPr>
+                <p:nvPr/>
+              </p:nvCxnSpPr>
+              <p:spPr>
+                <a:xfrm flipV="1">
+                  <a:off x="1335748" y="3445283"/>
+                  <a:ext cx="845196" cy="560"/>
+                </a:xfrm>
+                <a:prstGeom prst="straightConnector1">
+                  <a:avLst/>
+                </a:prstGeom>
+                <a:ln w="38100">
+                  <a:solidFill>
+                    <a:schemeClr val="tx1"/>
+                  </a:solidFill>
+                  <a:prstDash val="sysDot"/>
+                  <a:tailEnd type="triangle" w="lg" len="lg"/>
+                </a:ln>
+              </p:spPr>
+              <p:style>
+                <a:lnRef idx="1">
+                  <a:schemeClr val="accent1"/>
+                </a:lnRef>
+                <a:fillRef idx="0">
+                  <a:schemeClr val="accent1"/>
+                </a:fillRef>
+                <a:effectRef idx="0">
+                  <a:schemeClr val="accent1"/>
+                </a:effectRef>
+                <a:fontRef idx="minor">
+                  <a:schemeClr val="tx1"/>
+                </a:fontRef>
+              </p:style>
+            </p:cxnSp>
+            <p:sp>
+              <p:nvSpPr>
+                <p:cNvPr id="11" name="TextBox 10">
+                  <a:extLst>
+                    <a:ext uri="{FF2B5EF4-FFF2-40B4-BE49-F238E27FC236}">
+                      <a16:creationId xmlns:a16="http://schemas.microsoft.com/office/drawing/2014/main" id="{FF98DFCD-426A-4501-A258-61D745760FB4}"/>
+                    </a:ext>
+                  </a:extLst>
+                </p:cNvPr>
+                <p:cNvSpPr txBox="1"/>
+                <p:nvPr/>
+              </p:nvSpPr>
+              <p:spPr>
+                <a:xfrm>
+                  <a:off x="3376328" y="4017756"/>
+                  <a:ext cx="886305" cy="369332"/>
+                </a:xfrm>
+                <a:prstGeom prst="rect">
+                  <a:avLst/>
+                </a:prstGeom>
+                <a:noFill/>
+              </p:spPr>
+              <p:txBody>
+                <a:bodyPr wrap="square" rtlCol="0">
+                  <a:spAutoFit/>
+                </a:bodyPr>
+                <a:lstStyle/>
+                <a:p>
+                  <a:pPr algn="ctr"/>
+                  <a:r>
+                    <a:rPr lang="en-US" dirty="0"/>
+                    <a:t>–0.03</a:t>
+                  </a:r>
+                </a:p>
+              </p:txBody>
+            </p:sp>
+            <p:sp>
+              <p:nvSpPr>
+                <p:cNvPr id="12" name="TextBox 11">
+                  <a:extLst>
+                    <a:ext uri="{FF2B5EF4-FFF2-40B4-BE49-F238E27FC236}">
+                      <a16:creationId xmlns:a16="http://schemas.microsoft.com/office/drawing/2014/main" id="{09A1C860-B17B-4314-9E72-3128F9CB676B}"/>
+                    </a:ext>
+                  </a:extLst>
+                </p:cNvPr>
+                <p:cNvSpPr txBox="1"/>
+                <p:nvPr/>
+              </p:nvSpPr>
+              <p:spPr>
+                <a:xfrm>
+                  <a:off x="3828138" y="6111282"/>
+                  <a:ext cx="838456" cy="307777"/>
+                </a:xfrm>
+                <a:prstGeom prst="rect">
+                  <a:avLst/>
+                </a:prstGeom>
+                <a:noFill/>
+              </p:spPr>
+              <p:txBody>
+                <a:bodyPr wrap="square" rtlCol="0">
+                  <a:spAutoFit/>
+                </a:bodyPr>
+                <a:lstStyle/>
+                <a:p>
+                  <a:r>
+                    <a:rPr lang="en-US" sz="1400" dirty="0"/>
+                    <a:t>R</a:t>
+                  </a:r>
+                  <a:r>
+                    <a:rPr lang="en-US" sz="1400" baseline="30000" dirty="0"/>
+                    <a:t>2</a:t>
+                  </a:r>
+                  <a:r>
+                    <a:rPr lang="en-US" sz="1400" dirty="0"/>
+                    <a:t> = 0.73</a:t>
+                  </a:r>
+                </a:p>
+              </p:txBody>
+            </p:sp>
+            <p:sp>
+              <p:nvSpPr>
+                <p:cNvPr id="13" name="TextBox 12">
+                  <a:extLst>
+                    <a:ext uri="{FF2B5EF4-FFF2-40B4-BE49-F238E27FC236}">
+                      <a16:creationId xmlns:a16="http://schemas.microsoft.com/office/drawing/2014/main" id="{DA94F67D-964D-4F86-A62B-5108E0127417}"/>
+                    </a:ext>
+                  </a:extLst>
+                </p:cNvPr>
+                <p:cNvSpPr txBox="1"/>
+                <p:nvPr/>
+              </p:nvSpPr>
+              <p:spPr>
+                <a:xfrm>
+                  <a:off x="3809331" y="3747286"/>
+                  <a:ext cx="838456" cy="307777"/>
+                </a:xfrm>
+                <a:prstGeom prst="rect">
+                  <a:avLst/>
+                </a:prstGeom>
+                <a:noFill/>
+              </p:spPr>
+              <p:txBody>
+                <a:bodyPr wrap="square" rtlCol="0">
+                  <a:spAutoFit/>
+                </a:bodyPr>
+                <a:lstStyle/>
+                <a:p>
+                  <a:r>
+                    <a:rPr lang="en-US" sz="1400" dirty="0"/>
+                    <a:t>R</a:t>
+                  </a:r>
+                  <a:r>
+                    <a:rPr lang="en-US" sz="1400" baseline="30000" dirty="0"/>
+                    <a:t>2</a:t>
+                  </a:r>
+                  <a:r>
+                    <a:rPr lang="en-US" sz="1400" dirty="0"/>
+                    <a:t> = 0.00</a:t>
+                  </a:r>
+                </a:p>
+              </p:txBody>
+            </p:sp>
+            <p:sp>
+              <p:nvSpPr>
+                <p:cNvPr id="14" name="TextBox 13">
+                  <a:extLst>
+                    <a:ext uri="{FF2B5EF4-FFF2-40B4-BE49-F238E27FC236}">
+                      <a16:creationId xmlns:a16="http://schemas.microsoft.com/office/drawing/2014/main" id="{002B7438-49AA-48FD-905A-E112C0846428}"/>
+                    </a:ext>
+                  </a:extLst>
+                </p:cNvPr>
+                <p:cNvSpPr txBox="1"/>
+                <p:nvPr/>
+              </p:nvSpPr>
+              <p:spPr>
+                <a:xfrm>
+                  <a:off x="3804031" y="4797863"/>
+                  <a:ext cx="838456" cy="307777"/>
+                </a:xfrm>
+                <a:prstGeom prst="rect">
+                  <a:avLst/>
+                </a:prstGeom>
+                <a:noFill/>
+              </p:spPr>
+              <p:txBody>
+                <a:bodyPr wrap="square" rtlCol="0">
+                  <a:spAutoFit/>
+                </a:bodyPr>
+                <a:lstStyle/>
+                <a:p>
+                  <a:r>
+                    <a:rPr lang="en-US" sz="1400" dirty="0"/>
+                    <a:t>R</a:t>
+                  </a:r>
+                  <a:r>
+                    <a:rPr lang="en-US" sz="1400" baseline="30000" dirty="0"/>
+                    <a:t>2</a:t>
+                  </a:r>
+                  <a:r>
+                    <a:rPr lang="en-US" sz="1400" dirty="0"/>
+                    <a:t> = 0.56</a:t>
+                  </a:r>
+                </a:p>
+              </p:txBody>
+            </p:sp>
+            <p:cxnSp>
+              <p:nvCxnSpPr>
+                <p:cNvPr id="15" name="Straight Arrow Connector 14">
+                  <a:extLst>
+                    <a:ext uri="{FF2B5EF4-FFF2-40B4-BE49-F238E27FC236}">
+                      <a16:creationId xmlns:a16="http://schemas.microsoft.com/office/drawing/2014/main" id="{7AA22F43-79D5-43AF-B3D1-11950706C4F5}"/>
+                    </a:ext>
+                  </a:extLst>
+                </p:cNvPr>
+                <p:cNvCxnSpPr>
+                  <a:cxnSpLocks/>
+                </p:cNvCxnSpPr>
+                <p:nvPr/>
+              </p:nvCxnSpPr>
+              <p:spPr>
+                <a:xfrm>
+                  <a:off x="1335748" y="3458906"/>
+                  <a:ext cx="1228848" cy="957239"/>
+                </a:xfrm>
+                <a:prstGeom prst="straightConnector1">
+                  <a:avLst/>
+                </a:prstGeom>
+                <a:ln w="38100">
+                  <a:solidFill>
+                    <a:schemeClr val="tx1"/>
+                  </a:solidFill>
+                  <a:prstDash val="sysDot"/>
+                  <a:tailEnd type="triangle" w="lg" len="lg"/>
+                </a:ln>
+              </p:spPr>
+              <p:style>
+                <a:lnRef idx="1">
+                  <a:schemeClr val="accent1"/>
+                </a:lnRef>
+                <a:fillRef idx="0">
+                  <a:schemeClr val="accent1"/>
+                </a:fillRef>
+                <a:effectRef idx="0">
+                  <a:schemeClr val="accent1"/>
+                </a:effectRef>
+                <a:fontRef idx="minor">
+                  <a:schemeClr val="tx1"/>
+                </a:fontRef>
+              </p:style>
+            </p:cxnSp>
+            <p:sp>
+              <p:nvSpPr>
+                <p:cNvPr id="16" name="TextBox 15">
+                  <a:extLst>
+                    <a:ext uri="{FF2B5EF4-FFF2-40B4-BE49-F238E27FC236}">
+                      <a16:creationId xmlns:a16="http://schemas.microsoft.com/office/drawing/2014/main" id="{DDD67B90-6E0B-4D48-9B61-51F4377F1D8D}"/>
+                    </a:ext>
+                  </a:extLst>
+                </p:cNvPr>
+                <p:cNvSpPr txBox="1"/>
+                <p:nvPr/>
+              </p:nvSpPr>
+              <p:spPr>
+                <a:xfrm>
+                  <a:off x="2497369" y="7022587"/>
+                  <a:ext cx="1757917" cy="646331"/>
+                </a:xfrm>
+                <a:prstGeom prst="rect">
+                  <a:avLst/>
+                </a:prstGeom>
+                <a:noFill/>
+                <a:ln>
+                  <a:solidFill>
+                    <a:schemeClr val="tx1"/>
+                  </a:solidFill>
+                </a:ln>
+              </p:spPr>
+              <p:txBody>
+                <a:bodyPr wrap="square" rtlCol="0">
+                  <a:spAutoFit/>
+                </a:bodyPr>
+                <a:lstStyle/>
+                <a:p>
+                  <a:pPr algn="ctr"/>
+                  <a:r>
+                    <a:rPr lang="en-US" b="1" dirty="0"/>
+                    <a:t>Total Phosphorus</a:t>
+                  </a:r>
+                </a:p>
+              </p:txBody>
+            </p:sp>
+            <p:sp>
+              <p:nvSpPr>
+                <p:cNvPr id="17" name="TextBox 16">
+                  <a:extLst>
+                    <a:ext uri="{FF2B5EF4-FFF2-40B4-BE49-F238E27FC236}">
+                      <a16:creationId xmlns:a16="http://schemas.microsoft.com/office/drawing/2014/main" id="{00A8C4D3-667E-4C73-B5CC-2D6C40D34660}"/>
+                    </a:ext>
+                  </a:extLst>
+                </p:cNvPr>
+                <p:cNvSpPr txBox="1"/>
+                <p:nvPr/>
+              </p:nvSpPr>
+              <p:spPr>
+                <a:xfrm>
+                  <a:off x="3354732" y="6593000"/>
+                  <a:ext cx="1124264" cy="369332"/>
+                </a:xfrm>
+                <a:prstGeom prst="rect">
+                  <a:avLst/>
+                </a:prstGeom>
+                <a:noFill/>
+              </p:spPr>
+              <p:txBody>
+                <a:bodyPr wrap="square" rtlCol="0">
+                  <a:spAutoFit/>
+                </a:bodyPr>
+                <a:lstStyle/>
+                <a:p>
+                  <a:pPr algn="ctr"/>
+                  <a:r>
+                    <a:rPr lang="en-US" dirty="0"/>
+                    <a:t>+0.26***</a:t>
+                  </a:r>
+                </a:p>
+              </p:txBody>
+            </p:sp>
+            <p:cxnSp>
+              <p:nvCxnSpPr>
+                <p:cNvPr id="18" name="Straight Arrow Connector 17">
+                  <a:extLst>
+                    <a:ext uri="{FF2B5EF4-FFF2-40B4-BE49-F238E27FC236}">
+                      <a16:creationId xmlns:a16="http://schemas.microsoft.com/office/drawing/2014/main" id="{9B3249B0-1F65-4781-8726-D3B07A69B383}"/>
+                    </a:ext>
+                  </a:extLst>
+                </p:cNvPr>
+                <p:cNvCxnSpPr>
+                  <a:cxnSpLocks/>
+                  <a:stCxn id="16" idx="0"/>
+                  <a:endCxn id="5" idx="2"/>
+                </p:cNvCxnSpPr>
+                <p:nvPr/>
+              </p:nvCxnSpPr>
+              <p:spPr>
+                <a:xfrm flipH="1" flipV="1">
+                  <a:off x="3361818" y="6111865"/>
+                  <a:ext cx="14510" cy="910722"/>
+                </a:xfrm>
+                <a:prstGeom prst="straightConnector1">
+                  <a:avLst/>
+                </a:prstGeom>
+                <a:ln w="66040">
+                  <a:solidFill>
+                    <a:schemeClr val="tx1"/>
+                  </a:solidFill>
+                  <a:prstDash val="solid"/>
+                  <a:tailEnd type="triangle" w="lg" len="med"/>
+                </a:ln>
+              </p:spPr>
+              <p:style>
+                <a:lnRef idx="1">
+                  <a:schemeClr val="accent1"/>
+                </a:lnRef>
+                <a:fillRef idx="0">
+                  <a:schemeClr val="accent1"/>
+                </a:fillRef>
+                <a:effectRef idx="0">
+                  <a:schemeClr val="accent1"/>
+                </a:effectRef>
+                <a:fontRef idx="minor">
+                  <a:schemeClr val="tx1"/>
+                </a:fontRef>
+              </p:style>
+            </p:cxnSp>
+            <p:sp>
+              <p:nvSpPr>
+                <p:cNvPr id="19" name="TextBox 18">
+                  <a:extLst>
+                    <a:ext uri="{FF2B5EF4-FFF2-40B4-BE49-F238E27FC236}">
+                      <a16:creationId xmlns:a16="http://schemas.microsoft.com/office/drawing/2014/main" id="{916A99BF-BE81-4F74-9A2C-97E31D846E4F}"/>
+                    </a:ext>
+                  </a:extLst>
+                </p:cNvPr>
+                <p:cNvSpPr txBox="1"/>
+                <p:nvPr/>
+              </p:nvSpPr>
+              <p:spPr>
+                <a:xfrm>
+                  <a:off x="3330890" y="5022588"/>
+                  <a:ext cx="775160" cy="369332"/>
+                </a:xfrm>
+                <a:prstGeom prst="rect">
+                  <a:avLst/>
+                </a:prstGeom>
+                <a:noFill/>
+              </p:spPr>
+              <p:txBody>
+                <a:bodyPr wrap="square" rtlCol="0">
+                  <a:spAutoFit/>
+                </a:bodyPr>
+                <a:lstStyle/>
+                <a:p>
+                  <a:pPr algn="ctr"/>
+                  <a:r>
+                    <a:rPr lang="en-US" dirty="0"/>
+                    <a:t>–0.23</a:t>
+                  </a:r>
+                </a:p>
+              </p:txBody>
+            </p:sp>
+            <p:sp>
+              <p:nvSpPr>
+                <p:cNvPr id="20" name="TextBox 19">
+                  <a:extLst>
+                    <a:ext uri="{FF2B5EF4-FFF2-40B4-BE49-F238E27FC236}">
+                      <a16:creationId xmlns:a16="http://schemas.microsoft.com/office/drawing/2014/main" id="{8DB0FB3B-4DE5-43B2-ACA2-66F3CD9052F0}"/>
+                    </a:ext>
+                  </a:extLst>
+                </p:cNvPr>
+                <p:cNvSpPr txBox="1"/>
+                <p:nvPr/>
+              </p:nvSpPr>
+              <p:spPr>
+                <a:xfrm>
+                  <a:off x="1309824" y="3112377"/>
+                  <a:ext cx="752635" cy="369332"/>
+                </a:xfrm>
+                <a:prstGeom prst="rect">
+                  <a:avLst/>
+                </a:prstGeom>
+                <a:noFill/>
+                <a:ln>
+                  <a:noFill/>
+                </a:ln>
+              </p:spPr>
+              <p:txBody>
+                <a:bodyPr wrap="square" rtlCol="0">
+                  <a:spAutoFit/>
+                </a:bodyPr>
+                <a:lstStyle/>
+                <a:p>
+                  <a:pPr algn="ctr"/>
+                  <a:r>
+                    <a:rPr lang="en-US" dirty="0"/>
+                    <a:t>–0.01</a:t>
+                  </a:r>
+                </a:p>
+              </p:txBody>
+            </p:sp>
+            <p:sp>
+              <p:nvSpPr>
+                <p:cNvPr id="21" name="TextBox 20">
+                  <a:extLst>
+                    <a:ext uri="{FF2B5EF4-FFF2-40B4-BE49-F238E27FC236}">
+                      <a16:creationId xmlns:a16="http://schemas.microsoft.com/office/drawing/2014/main" id="{A63DD4FC-6F1F-48B9-92FF-F127C87275DB}"/>
+                    </a:ext>
+                  </a:extLst>
+                </p:cNvPr>
+                <p:cNvSpPr txBox="1"/>
+                <p:nvPr/>
+              </p:nvSpPr>
+              <p:spPr>
+                <a:xfrm>
+                  <a:off x="2029463" y="3801914"/>
+                  <a:ext cx="717877" cy="369332"/>
+                </a:xfrm>
+                <a:prstGeom prst="rect">
+                  <a:avLst/>
+                </a:prstGeom>
+                <a:noFill/>
+                <a:ln>
+                  <a:noFill/>
+                </a:ln>
+              </p:spPr>
+              <p:txBody>
+                <a:bodyPr wrap="square" rtlCol="0">
+                  <a:spAutoFit/>
+                </a:bodyPr>
+                <a:lstStyle/>
+                <a:p>
+                  <a:pPr algn="ctr"/>
+                  <a:r>
+                    <a:rPr lang="en-US" dirty="0"/>
+                    <a:t>0.22</a:t>
+                  </a:r>
+                </a:p>
+              </p:txBody>
+            </p:sp>
+            <p:sp>
+              <p:nvSpPr>
+                <p:cNvPr id="22" name="TextBox 21">
+                  <a:extLst>
+                    <a:ext uri="{FF2B5EF4-FFF2-40B4-BE49-F238E27FC236}">
+                      <a16:creationId xmlns:a16="http://schemas.microsoft.com/office/drawing/2014/main" id="{E7735762-A518-4C77-9BFD-A20D151655CF}"/>
+                    </a:ext>
+                  </a:extLst>
+                </p:cNvPr>
+                <p:cNvSpPr txBox="1"/>
+                <p:nvPr/>
+              </p:nvSpPr>
+              <p:spPr>
+                <a:xfrm>
+                  <a:off x="4947798" y="6022449"/>
+                  <a:ext cx="838456" cy="369332"/>
+                </a:xfrm>
+                <a:prstGeom prst="rect">
+                  <a:avLst/>
+                </a:prstGeom>
+                <a:noFill/>
+              </p:spPr>
+              <p:txBody>
+                <a:bodyPr wrap="square" rtlCol="0">
+                  <a:spAutoFit/>
+                </a:bodyPr>
+                <a:lstStyle/>
+                <a:p>
+                  <a:pPr algn="ctr"/>
+                  <a:r>
+                    <a:rPr lang="en-US" dirty="0"/>
+                    <a:t>0.15</a:t>
+                  </a:r>
+                </a:p>
+              </p:txBody>
+            </p:sp>
+            <p:cxnSp>
+              <p:nvCxnSpPr>
+                <p:cNvPr id="23" name="Straight Arrow Connector 22">
+                  <a:extLst>
+                    <a:ext uri="{FF2B5EF4-FFF2-40B4-BE49-F238E27FC236}">
+                      <a16:creationId xmlns:a16="http://schemas.microsoft.com/office/drawing/2014/main" id="{9B009CF7-CE56-404D-BBEE-CE04A1F4716D}"/>
+                    </a:ext>
+                  </a:extLst>
+                </p:cNvPr>
+                <p:cNvCxnSpPr>
+                  <a:cxnSpLocks/>
+                </p:cNvCxnSpPr>
+                <p:nvPr/>
+              </p:nvCxnSpPr>
+              <p:spPr>
+                <a:xfrm>
+                  <a:off x="1335748" y="3445843"/>
+                  <a:ext cx="935618" cy="2051777"/>
+                </a:xfrm>
+                <a:prstGeom prst="straightConnector1">
+                  <a:avLst/>
+                </a:prstGeom>
+                <a:ln w="38100">
+                  <a:solidFill>
+                    <a:schemeClr val="tx1"/>
+                  </a:solidFill>
+                  <a:prstDash val="sysDot"/>
+                  <a:tailEnd type="triangle" w="lg" len="lg"/>
+                </a:ln>
+              </p:spPr>
+              <p:style>
+                <a:lnRef idx="1">
+                  <a:schemeClr val="accent1"/>
+                </a:lnRef>
+                <a:fillRef idx="0">
+                  <a:schemeClr val="accent1"/>
+                </a:fillRef>
+                <a:effectRef idx="0">
+                  <a:schemeClr val="accent1"/>
+                </a:effectRef>
+                <a:fontRef idx="minor">
+                  <a:schemeClr val="tx1"/>
+                </a:fontRef>
+              </p:style>
+            </p:cxnSp>
+            <p:sp>
+              <p:nvSpPr>
+                <p:cNvPr id="24" name="TextBox 23">
+                  <a:extLst>
+                    <a:ext uri="{FF2B5EF4-FFF2-40B4-BE49-F238E27FC236}">
+                      <a16:creationId xmlns:a16="http://schemas.microsoft.com/office/drawing/2014/main" id="{8E941D0C-71C0-4531-BF11-949515848E90}"/>
+                    </a:ext>
+                  </a:extLst>
+                </p:cNvPr>
+                <p:cNvSpPr txBox="1"/>
+                <p:nvPr/>
+              </p:nvSpPr>
+              <p:spPr>
+                <a:xfrm>
+                  <a:off x="1229740" y="4441434"/>
+                  <a:ext cx="669876" cy="369332"/>
+                </a:xfrm>
+                <a:prstGeom prst="rect">
+                  <a:avLst/>
+                </a:prstGeom>
+                <a:noFill/>
+                <a:ln>
+                  <a:noFill/>
+                </a:ln>
+              </p:spPr>
+              <p:txBody>
+                <a:bodyPr wrap="square" rtlCol="0">
+                  <a:spAutoFit/>
+                </a:bodyPr>
+                <a:lstStyle/>
+                <a:p>
+                  <a:pPr algn="ctr"/>
+                  <a:r>
+                    <a:rPr lang="en-US" dirty="0"/>
+                    <a:t>0.04</a:t>
+                  </a:r>
+                </a:p>
+              </p:txBody>
+            </p:sp>
+            <p:cxnSp>
+              <p:nvCxnSpPr>
+                <p:cNvPr id="25" name="Connector: Curved 24">
+                  <a:extLst>
+                    <a:ext uri="{FF2B5EF4-FFF2-40B4-BE49-F238E27FC236}">
+                      <a16:creationId xmlns:a16="http://schemas.microsoft.com/office/drawing/2014/main" id="{BB137E5C-0503-406F-8E44-7F160ABB0842}"/>
+                    </a:ext>
+                  </a:extLst>
+                </p:cNvPr>
+                <p:cNvCxnSpPr>
+                  <a:stCxn id="4" idx="3"/>
+                  <a:endCxn id="16" idx="3"/>
+                </p:cNvCxnSpPr>
+                <p:nvPr/>
+              </p:nvCxnSpPr>
+              <p:spPr>
+                <a:xfrm flipH="1">
+                  <a:off x="4255286" y="4611813"/>
+                  <a:ext cx="97821" cy="2733940"/>
+                </a:xfrm>
+                <a:prstGeom prst="curvedConnector3">
+                  <a:avLst>
+                    <a:gd name="adj1" fmla="val -683237"/>
+                  </a:avLst>
+                </a:prstGeom>
+                <a:ln w="38100">
+                  <a:solidFill>
+                    <a:schemeClr val="tx1"/>
+                  </a:solidFill>
+                  <a:prstDash val="sysDot"/>
+                  <a:headEnd type="triangle" w="lg" len="lg"/>
+                  <a:tailEnd type="triangle" w="lg" len="lg"/>
+                </a:ln>
+              </p:spPr>
+              <p:style>
+                <a:lnRef idx="1">
+                  <a:schemeClr val="accent1"/>
+                </a:lnRef>
+                <a:fillRef idx="0">
+                  <a:schemeClr val="accent1"/>
+                </a:fillRef>
+                <a:effectRef idx="0">
+                  <a:schemeClr val="accent1"/>
+                </a:effectRef>
+                <a:fontRef idx="minor">
+                  <a:schemeClr val="tx1"/>
+                </a:fontRef>
+              </p:style>
+            </p:cxnSp>
+            <p:sp>
+              <p:nvSpPr>
+                <p:cNvPr id="5" name="TextBox 4">
+                  <a:extLst>
+                    <a:ext uri="{FF2B5EF4-FFF2-40B4-BE49-F238E27FC236}">
+                      <a16:creationId xmlns:a16="http://schemas.microsoft.com/office/drawing/2014/main" id="{C56C68F1-3328-43A9-AD7A-E166D84631E3}"/>
+                    </a:ext>
+                  </a:extLst>
+                </p:cNvPr>
+                <p:cNvSpPr txBox="1"/>
+                <p:nvPr/>
+              </p:nvSpPr>
+              <p:spPr>
+                <a:xfrm>
+                  <a:off x="2263300" y="5465534"/>
+                  <a:ext cx="2197035" cy="646331"/>
+                </a:xfrm>
+                <a:prstGeom prst="rect">
+                  <a:avLst/>
+                </a:prstGeom>
+                <a:solidFill>
+                  <a:schemeClr val="bg1"/>
+                </a:solidFill>
+                <a:ln>
+                  <a:solidFill>
+                    <a:schemeClr val="tx1"/>
+                  </a:solidFill>
+                </a:ln>
+              </p:spPr>
+              <p:txBody>
+                <a:bodyPr wrap="square" rtlCol="0">
+                  <a:spAutoFit/>
+                </a:bodyPr>
+                <a:lstStyle/>
+                <a:p>
+                  <a:pPr algn="ctr"/>
+                  <a:r>
+                    <a:rPr lang="en-US" dirty="0"/>
+                    <a:t>Phytoplankton</a:t>
+                  </a:r>
+                </a:p>
+                <a:p>
+                  <a:pPr algn="ctr"/>
+                  <a:r>
+                    <a:rPr lang="en-US" dirty="0"/>
+                    <a:t>(edible chlorophyll </a:t>
+                  </a:r>
+                  <a:r>
+                    <a:rPr lang="en-US" i="1" dirty="0"/>
+                    <a:t>a</a:t>
+                  </a:r>
+                  <a:r>
+                    <a:rPr lang="en-US" dirty="0"/>
+                    <a:t>)</a:t>
+                  </a:r>
+                </a:p>
+              </p:txBody>
+            </p:sp>
+            <p:sp>
+              <p:nvSpPr>
+                <p:cNvPr id="7" name="TextBox 6">
+                  <a:extLst>
+                    <a:ext uri="{FF2B5EF4-FFF2-40B4-BE49-F238E27FC236}">
+                      <a16:creationId xmlns:a16="http://schemas.microsoft.com/office/drawing/2014/main" id="{E22D0DA4-F4AA-4DD3-A0E2-028A29B5C57B}"/>
+                    </a:ext>
+                  </a:extLst>
+                </p:cNvPr>
+                <p:cNvSpPr txBox="1"/>
+                <p:nvPr/>
+              </p:nvSpPr>
+              <p:spPr>
+                <a:xfrm>
+                  <a:off x="435822" y="3261177"/>
+                  <a:ext cx="899926" cy="369332"/>
+                </a:xfrm>
+                <a:prstGeom prst="rect">
+                  <a:avLst/>
+                </a:prstGeom>
+                <a:solidFill>
+                  <a:schemeClr val="bg1"/>
+                </a:solidFill>
+                <a:ln>
+                  <a:solidFill>
+                    <a:schemeClr val="tx1"/>
+                  </a:solidFill>
+                </a:ln>
+              </p:spPr>
+              <p:txBody>
+                <a:bodyPr wrap="square" rtlCol="0">
+                  <a:spAutoFit/>
+                </a:bodyPr>
+                <a:lstStyle/>
+                <a:p>
+                  <a:pPr algn="ctr"/>
+                  <a:r>
+                    <a:rPr lang="en-US" b="1" dirty="0"/>
+                    <a:t>Mixing</a:t>
+                  </a:r>
+                </a:p>
+              </p:txBody>
+            </p:sp>
+          </p:grpSp>
+          <p:cxnSp>
+            <p:nvCxnSpPr>
+              <p:cNvPr id="48" name="Connector: Curved 47">
+                <a:extLst>
+                  <a:ext uri="{FF2B5EF4-FFF2-40B4-BE49-F238E27FC236}">
+                    <a16:creationId xmlns:a16="http://schemas.microsoft.com/office/drawing/2014/main" id="{9BE7C736-6937-7EE1-0A4F-31B37E520BD5}"/>
+                  </a:ext>
+                </a:extLst>
+              </p:cNvPr>
+              <p:cNvCxnSpPr>
+                <a:cxnSpLocks/>
+                <a:stCxn id="5" idx="3"/>
+                <a:endCxn id="8" idx="3"/>
+              </p:cNvCxnSpPr>
+              <p:nvPr/>
+            </p:nvCxnSpPr>
+            <p:spPr>
+              <a:xfrm flipV="1">
+                <a:off x="4717787" y="2033734"/>
+                <a:ext cx="88946" cy="2343417"/>
+              </a:xfrm>
+              <a:prstGeom prst="curvedConnector3">
+                <a:avLst>
+                  <a:gd name="adj1" fmla="val 719271"/>
+                </a:avLst>
+              </a:prstGeom>
+              <a:ln w="38100">
+                <a:prstDash val="sysDot"/>
+                <a:tailEnd type="triangle" w="lg" len="lg"/>
+              </a:ln>
+            </p:spPr>
+            <p:style>
+              <a:lnRef idx="1">
+                <a:schemeClr val="dk1"/>
+              </a:lnRef>
+              <a:fillRef idx="0">
+                <a:schemeClr val="dk1"/>
+              </a:fillRef>
+              <a:effectRef idx="0">
+                <a:schemeClr val="dk1"/>
+              </a:effectRef>
+              <a:fontRef idx="minor">
+                <a:schemeClr val="tx1"/>
+              </a:fontRef>
+            </p:style>
+          </p:cxnSp>
+          <p:sp>
+            <p:nvSpPr>
+              <p:cNvPr id="50" name="TextBox 49">
+                <a:extLst>
+                  <a:ext uri="{FF2B5EF4-FFF2-40B4-BE49-F238E27FC236}">
+                    <a16:creationId xmlns:a16="http://schemas.microsoft.com/office/drawing/2014/main" id="{C55A03C0-3A9E-48C8-8F2C-EACC065A2197}"/>
+                  </a:ext>
+                </a:extLst>
+              </p:cNvPr>
+              <p:cNvSpPr txBox="1"/>
+              <p:nvPr/>
+            </p:nvSpPr>
+            <p:spPr>
+              <a:xfrm>
+                <a:off x="5275862" y="2879376"/>
+                <a:ext cx="864650" cy="369332"/>
+              </a:xfrm>
+              <a:prstGeom prst="rect">
+                <a:avLst/>
+              </a:prstGeom>
+              <a:noFill/>
+            </p:spPr>
+            <p:txBody>
+              <a:bodyPr wrap="square" rtlCol="0">
+                <a:spAutoFit/>
+              </a:bodyPr>
+              <a:lstStyle/>
+              <a:p>
+                <a:pPr algn="ctr"/>
+                <a:r>
+                  <a:rPr lang="en-US" dirty="0"/>
+                  <a:t>–0.07</a:t>
+                </a:r>
+              </a:p>
+            </p:txBody>
+          </p:sp>
+        </p:grpSp>
+      </p:grpSp>
+      <p:grpSp>
+        <p:nvGrpSpPr>
+          <p:cNvPr id="2" name="Group 1">
+            <a:extLst>
+              <a:ext uri="{FF2B5EF4-FFF2-40B4-BE49-F238E27FC236}">
+                <a16:creationId xmlns:a16="http://schemas.microsoft.com/office/drawing/2014/main" id="{6AEBE224-2ACC-6665-2C05-4022C9CD99D4}"/>
+              </a:ext>
+            </a:extLst>
+          </p:cNvPr>
+          <p:cNvGrpSpPr/>
+          <p:nvPr/>
+        </p:nvGrpSpPr>
+        <p:grpSpPr>
+          <a:xfrm>
+            <a:off x="5650634" y="252295"/>
+            <a:ext cx="5455329" cy="5012868"/>
+            <a:chOff x="693274" y="1079878"/>
+            <a:chExt cx="5455329" cy="5012868"/>
+          </a:xfrm>
+        </p:grpSpPr>
+        <p:grpSp>
+          <p:nvGrpSpPr>
+            <p:cNvPr id="3" name="Group 2">
+              <a:extLst>
+                <a:ext uri="{FF2B5EF4-FFF2-40B4-BE49-F238E27FC236}">
+                  <a16:creationId xmlns:a16="http://schemas.microsoft.com/office/drawing/2014/main" id="{20746761-E1B0-32DD-5F5A-9EFE6BECF351}"/>
+                </a:ext>
+              </a:extLst>
+            </p:cNvPr>
+            <p:cNvGrpSpPr/>
+            <p:nvPr/>
+          </p:nvGrpSpPr>
+          <p:grpSpPr>
+            <a:xfrm>
+              <a:off x="693274" y="1614165"/>
+              <a:ext cx="4212502" cy="4478581"/>
+              <a:chOff x="435822" y="3087862"/>
+              <a:chExt cx="4212502" cy="4478581"/>
+            </a:xfrm>
+          </p:grpSpPr>
+          <p:cxnSp>
+            <p:nvCxnSpPr>
+              <p:cNvPr id="49" name="Straight Arrow Connector 48">
+                <a:extLst>
+                  <a:ext uri="{FF2B5EF4-FFF2-40B4-BE49-F238E27FC236}">
+                    <a16:creationId xmlns:a16="http://schemas.microsoft.com/office/drawing/2014/main" id="{2BA57666-4679-2F0B-032F-00595EC0C88A}"/>
+                  </a:ext>
+                </a:extLst>
+              </p:cNvPr>
+              <p:cNvCxnSpPr/>
+              <p:nvPr/>
+            </p:nvCxnSpPr>
+            <p:spPr>
+              <a:xfrm flipV="1">
+                <a:off x="3371518" y="4807481"/>
+                <a:ext cx="0" cy="675852"/>
+              </a:xfrm>
+              <a:prstGeom prst="straightConnector1">
+                <a:avLst/>
+              </a:prstGeom>
+              <a:ln w="38100">
+                <a:solidFill>
+                  <a:schemeClr val="tx1"/>
+                </a:solidFill>
+                <a:prstDash val="sysDot"/>
+                <a:tailEnd type="triangle" w="lg" len="lg"/>
+              </a:ln>
+            </p:spPr>
+            <p:style>
+              <a:lnRef idx="1">
+                <a:schemeClr val="accent1"/>
+              </a:lnRef>
+              <a:fillRef idx="0">
+                <a:schemeClr val="accent1"/>
+              </a:fillRef>
+              <a:effectRef idx="0">
+                <a:schemeClr val="accent1"/>
+              </a:effectRef>
+              <a:fontRef idx="minor">
+                <a:schemeClr val="tx1"/>
+              </a:fontRef>
+            </p:style>
+          </p:cxnSp>
+          <p:cxnSp>
+            <p:nvCxnSpPr>
+              <p:cNvPr id="51" name="Straight Arrow Connector 50">
+                <a:extLst>
+                  <a:ext uri="{FF2B5EF4-FFF2-40B4-BE49-F238E27FC236}">
+                    <a16:creationId xmlns:a16="http://schemas.microsoft.com/office/drawing/2014/main" id="{1C200EDC-EF95-A0D1-5195-7E4BC3E1D595}"/>
+                  </a:ext>
+                </a:extLst>
+              </p:cNvPr>
+              <p:cNvCxnSpPr>
+                <a:cxnSpLocks/>
+                <a:stCxn id="69" idx="3"/>
+                <a:endCxn id="45" idx="1"/>
+              </p:cNvCxnSpPr>
+              <p:nvPr/>
+            </p:nvCxnSpPr>
+            <p:spPr>
+              <a:xfrm flipV="1">
+                <a:off x="1335748" y="3438321"/>
+                <a:ext cx="827491" cy="7522"/>
+              </a:xfrm>
+              <a:prstGeom prst="straightConnector1">
+                <a:avLst/>
+              </a:prstGeom>
+              <a:ln w="38100">
+                <a:solidFill>
+                  <a:schemeClr val="tx1"/>
+                </a:solidFill>
+                <a:prstDash val="sysDot"/>
+                <a:tailEnd type="triangle" w="lg" len="lg"/>
+              </a:ln>
+            </p:spPr>
+            <p:style>
+              <a:lnRef idx="1">
+                <a:schemeClr val="accent1"/>
+              </a:lnRef>
+              <a:fillRef idx="0">
+                <a:schemeClr val="accent1"/>
+              </a:fillRef>
+              <a:effectRef idx="0">
+                <a:schemeClr val="accent1"/>
+              </a:effectRef>
+              <a:fontRef idx="minor">
+                <a:schemeClr val="tx1"/>
+              </a:fontRef>
+            </p:style>
+          </p:cxnSp>
+          <p:cxnSp>
+            <p:nvCxnSpPr>
+              <p:cNvPr id="52" name="Straight Arrow Connector 51">
+                <a:extLst>
+                  <a:ext uri="{FF2B5EF4-FFF2-40B4-BE49-F238E27FC236}">
+                    <a16:creationId xmlns:a16="http://schemas.microsoft.com/office/drawing/2014/main" id="{9158906F-E1E0-0BB8-7515-B69B021EBF46}"/>
+                  </a:ext>
+                </a:extLst>
+              </p:cNvPr>
+              <p:cNvCxnSpPr>
+                <a:cxnSpLocks/>
+              </p:cNvCxnSpPr>
+              <p:nvPr/>
+            </p:nvCxnSpPr>
+            <p:spPr>
+              <a:xfrm flipV="1">
+                <a:off x="3354732" y="3767841"/>
+                <a:ext cx="0" cy="675852"/>
+              </a:xfrm>
+              <a:prstGeom prst="straightConnector1">
+                <a:avLst/>
+              </a:prstGeom>
+              <a:ln w="38100">
+                <a:solidFill>
+                  <a:schemeClr val="tx1"/>
+                </a:solidFill>
+                <a:prstDash val="sysDot"/>
+                <a:tailEnd type="triangle" w="lg" len="lg"/>
+              </a:ln>
+            </p:spPr>
+            <p:style>
+              <a:lnRef idx="1">
+                <a:schemeClr val="accent1"/>
+              </a:lnRef>
+              <a:fillRef idx="0">
+                <a:schemeClr val="accent1"/>
+              </a:fillRef>
+              <a:effectRef idx="0">
+                <a:schemeClr val="accent1"/>
+              </a:effectRef>
+              <a:fontRef idx="minor">
+                <a:schemeClr val="tx1"/>
+              </a:fontRef>
+            </p:style>
+          </p:cxnSp>
+          <p:sp>
+            <p:nvSpPr>
+              <p:cNvPr id="53" name="TextBox 52">
+                <a:extLst>
+                  <a:ext uri="{FF2B5EF4-FFF2-40B4-BE49-F238E27FC236}">
+                    <a16:creationId xmlns:a16="http://schemas.microsoft.com/office/drawing/2014/main" id="{C3CF1982-E5D9-90B2-B75A-A4B5535EF15A}"/>
+                  </a:ext>
+                </a:extLst>
+              </p:cNvPr>
+              <p:cNvSpPr txBox="1"/>
+              <p:nvPr/>
+            </p:nvSpPr>
+            <p:spPr>
+              <a:xfrm>
+                <a:off x="3415515" y="4017756"/>
+                <a:ext cx="774844" cy="369332"/>
+              </a:xfrm>
+              <a:prstGeom prst="rect">
+                <a:avLst/>
+              </a:prstGeom>
+              <a:noFill/>
+            </p:spPr>
+            <p:txBody>
+              <a:bodyPr wrap="square" rtlCol="0">
+                <a:spAutoFit/>
+              </a:bodyPr>
+              <a:lstStyle/>
+              <a:p>
+                <a:pPr algn="ctr"/>
+                <a:r>
+                  <a:rPr lang="en-US" dirty="0"/>
+                  <a:t>–0.03</a:t>
+                </a:r>
+              </a:p>
+            </p:txBody>
+          </p:sp>
+          <p:sp>
+            <p:nvSpPr>
+              <p:cNvPr id="54" name="TextBox 53">
+                <a:extLst>
+                  <a:ext uri="{FF2B5EF4-FFF2-40B4-BE49-F238E27FC236}">
+                    <a16:creationId xmlns:a16="http://schemas.microsoft.com/office/drawing/2014/main" id="{046B4712-D180-8524-2A71-F938AF6A4B27}"/>
+                  </a:ext>
+                </a:extLst>
+              </p:cNvPr>
+              <p:cNvSpPr txBox="1"/>
+              <p:nvPr/>
+            </p:nvSpPr>
+            <p:spPr>
+              <a:xfrm>
+                <a:off x="3809868" y="6120472"/>
+                <a:ext cx="838456" cy="307777"/>
+              </a:xfrm>
+              <a:prstGeom prst="rect">
+                <a:avLst/>
+              </a:prstGeom>
+              <a:noFill/>
+            </p:spPr>
+            <p:txBody>
+              <a:bodyPr wrap="square" rtlCol="0">
+                <a:spAutoFit/>
+              </a:bodyPr>
+              <a:lstStyle/>
+              <a:p>
+                <a:r>
+                  <a:rPr lang="en-US" sz="1400" dirty="0"/>
+                  <a:t>R</a:t>
+                </a:r>
+                <a:r>
+                  <a:rPr lang="en-US" sz="1400" baseline="30000" dirty="0"/>
+                  <a:t>2</a:t>
+                </a:r>
+                <a:r>
+                  <a:rPr lang="en-US" sz="1400" dirty="0"/>
+                  <a:t> = 0.77</a:t>
+                </a:r>
+              </a:p>
+            </p:txBody>
+          </p:sp>
+          <p:sp>
+            <p:nvSpPr>
+              <p:cNvPr id="55" name="TextBox 54">
+                <a:extLst>
+                  <a:ext uri="{FF2B5EF4-FFF2-40B4-BE49-F238E27FC236}">
+                    <a16:creationId xmlns:a16="http://schemas.microsoft.com/office/drawing/2014/main" id="{18AB6F44-946B-3CF2-7D76-0E550DEEF92B}"/>
+                  </a:ext>
+                </a:extLst>
+              </p:cNvPr>
+              <p:cNvSpPr txBox="1"/>
+              <p:nvPr/>
+            </p:nvSpPr>
+            <p:spPr>
+              <a:xfrm>
+                <a:off x="3791318" y="3745613"/>
+                <a:ext cx="838456" cy="307777"/>
+              </a:xfrm>
+              <a:prstGeom prst="rect">
+                <a:avLst/>
+              </a:prstGeom>
+              <a:noFill/>
+            </p:spPr>
+            <p:txBody>
+              <a:bodyPr wrap="square" rtlCol="0">
+                <a:spAutoFit/>
+              </a:bodyPr>
+              <a:lstStyle/>
+              <a:p>
+                <a:r>
+                  <a:rPr lang="en-US" sz="1400" dirty="0"/>
+                  <a:t>R</a:t>
+                </a:r>
+                <a:r>
+                  <a:rPr lang="en-US" sz="1400" baseline="30000" dirty="0"/>
+                  <a:t>2</a:t>
+                </a:r>
+                <a:r>
+                  <a:rPr lang="en-US" sz="1400" dirty="0"/>
+                  <a:t> = 0.00</a:t>
+                </a:r>
+              </a:p>
+            </p:txBody>
+          </p:sp>
+          <p:sp>
+            <p:nvSpPr>
+              <p:cNvPr id="56" name="TextBox 55">
+                <a:extLst>
+                  <a:ext uri="{FF2B5EF4-FFF2-40B4-BE49-F238E27FC236}">
+                    <a16:creationId xmlns:a16="http://schemas.microsoft.com/office/drawing/2014/main" id="{0729052C-C537-ECE6-EBBF-C68659377E5A}"/>
+                  </a:ext>
+                </a:extLst>
+              </p:cNvPr>
+              <p:cNvSpPr txBox="1"/>
+              <p:nvPr/>
+            </p:nvSpPr>
+            <p:spPr>
+              <a:xfrm>
+                <a:off x="3804031" y="4797863"/>
+                <a:ext cx="838456" cy="307777"/>
+              </a:xfrm>
+              <a:prstGeom prst="rect">
+                <a:avLst/>
+              </a:prstGeom>
+              <a:noFill/>
+            </p:spPr>
+            <p:txBody>
+              <a:bodyPr wrap="square" rtlCol="0">
+                <a:spAutoFit/>
+              </a:bodyPr>
+              <a:lstStyle/>
+              <a:p>
+                <a:r>
+                  <a:rPr lang="en-US" sz="1400" dirty="0"/>
+                  <a:t>R</a:t>
+                </a:r>
+                <a:r>
+                  <a:rPr lang="en-US" sz="1400" baseline="30000" dirty="0"/>
+                  <a:t>2</a:t>
+                </a:r>
+                <a:r>
+                  <a:rPr lang="en-US" sz="1400" dirty="0"/>
+                  <a:t> = 0.56</a:t>
+                </a:r>
+              </a:p>
+            </p:txBody>
+          </p:sp>
+          <p:cxnSp>
+            <p:nvCxnSpPr>
+              <p:cNvPr id="57" name="Straight Arrow Connector 56">
+                <a:extLst>
+                  <a:ext uri="{FF2B5EF4-FFF2-40B4-BE49-F238E27FC236}">
+                    <a16:creationId xmlns:a16="http://schemas.microsoft.com/office/drawing/2014/main" id="{2062D936-AE24-403B-F205-0EA6124D1C36}"/>
+                  </a:ext>
+                </a:extLst>
+              </p:cNvPr>
+              <p:cNvCxnSpPr>
+                <a:cxnSpLocks/>
+              </p:cNvCxnSpPr>
+              <p:nvPr/>
+            </p:nvCxnSpPr>
+            <p:spPr>
+              <a:xfrm>
+                <a:off x="1335748" y="3458906"/>
+                <a:ext cx="1228848" cy="957239"/>
+              </a:xfrm>
+              <a:prstGeom prst="straightConnector1">
+                <a:avLst/>
+              </a:prstGeom>
+              <a:ln w="38100">
+                <a:solidFill>
+                  <a:schemeClr val="tx1"/>
+                </a:solidFill>
+                <a:prstDash val="sysDot"/>
+                <a:tailEnd type="triangle" w="lg" len="lg"/>
+              </a:ln>
+            </p:spPr>
+            <p:style>
+              <a:lnRef idx="1">
+                <a:schemeClr val="accent1"/>
+              </a:lnRef>
+              <a:fillRef idx="0">
+                <a:schemeClr val="accent1"/>
+              </a:fillRef>
+              <a:effectRef idx="0">
+                <a:schemeClr val="accent1"/>
+              </a:effectRef>
+              <a:fontRef idx="minor">
+                <a:schemeClr val="tx1"/>
+              </a:fontRef>
+            </p:style>
+          </p:cxnSp>
+          <p:sp>
+            <p:nvSpPr>
+              <p:cNvPr id="61" name="TextBox 60">
+                <a:extLst>
+                  <a:ext uri="{FF2B5EF4-FFF2-40B4-BE49-F238E27FC236}">
+                    <a16:creationId xmlns:a16="http://schemas.microsoft.com/office/drawing/2014/main" id="{966EA16F-C582-3153-9447-91EFF99EC8B3}"/>
+                  </a:ext>
+                </a:extLst>
+              </p:cNvPr>
+              <p:cNvSpPr txBox="1"/>
+              <p:nvPr/>
+            </p:nvSpPr>
+            <p:spPr>
+              <a:xfrm>
+                <a:off x="2492559" y="7197111"/>
+                <a:ext cx="1757917" cy="369332"/>
+              </a:xfrm>
+              <a:prstGeom prst="rect">
+                <a:avLst/>
+              </a:prstGeom>
+              <a:noFill/>
+              <a:ln>
+                <a:solidFill>
+                  <a:schemeClr val="tx1"/>
+                </a:solidFill>
+              </a:ln>
+            </p:spPr>
+            <p:txBody>
+              <a:bodyPr wrap="square" rtlCol="0">
+                <a:spAutoFit/>
+              </a:bodyPr>
+              <a:lstStyle/>
+              <a:p>
+                <a:pPr algn="ctr"/>
+                <a:r>
+                  <a:rPr lang="en-US" b="1" dirty="0"/>
+                  <a:t>Total Nitrogen</a:t>
+                </a:r>
+              </a:p>
+            </p:txBody>
+          </p:sp>
+          <p:sp>
+            <p:nvSpPr>
+              <p:cNvPr id="62" name="TextBox 61">
+                <a:extLst>
+                  <a:ext uri="{FF2B5EF4-FFF2-40B4-BE49-F238E27FC236}">
+                    <a16:creationId xmlns:a16="http://schemas.microsoft.com/office/drawing/2014/main" id="{C7261A61-AFAD-4FED-5D01-848E79D1F40B}"/>
+                  </a:ext>
+                </a:extLst>
+              </p:cNvPr>
+              <p:cNvSpPr txBox="1"/>
+              <p:nvPr/>
+            </p:nvSpPr>
+            <p:spPr>
+              <a:xfrm>
+                <a:off x="3327719" y="6611904"/>
+                <a:ext cx="1124264" cy="369332"/>
+              </a:xfrm>
+              <a:prstGeom prst="rect">
+                <a:avLst/>
+              </a:prstGeom>
+              <a:noFill/>
+            </p:spPr>
+            <p:txBody>
+              <a:bodyPr wrap="square" rtlCol="0">
+                <a:spAutoFit/>
+              </a:bodyPr>
+              <a:lstStyle/>
+              <a:p>
+                <a:pPr algn="ctr"/>
+                <a:r>
+                  <a:rPr lang="en-US" dirty="0"/>
+                  <a:t>+0.29***</a:t>
+                </a:r>
+              </a:p>
+            </p:txBody>
+          </p:sp>
+          <p:cxnSp>
+            <p:nvCxnSpPr>
+              <p:cNvPr id="63" name="Straight Arrow Connector 62">
+                <a:extLst>
+                  <a:ext uri="{FF2B5EF4-FFF2-40B4-BE49-F238E27FC236}">
+                    <a16:creationId xmlns:a16="http://schemas.microsoft.com/office/drawing/2014/main" id="{57CDD9AC-B812-04D5-2496-69FD41728968}"/>
+                  </a:ext>
+                </a:extLst>
+              </p:cNvPr>
+              <p:cNvCxnSpPr>
+                <a:cxnSpLocks/>
+                <a:stCxn id="61" idx="0"/>
+                <a:endCxn id="71" idx="2"/>
+              </p:cNvCxnSpPr>
+              <p:nvPr/>
+            </p:nvCxnSpPr>
+            <p:spPr>
+              <a:xfrm flipH="1" flipV="1">
+                <a:off x="3350137" y="6129664"/>
+                <a:ext cx="21381" cy="1067447"/>
+              </a:xfrm>
+              <a:prstGeom prst="straightConnector1">
+                <a:avLst/>
+              </a:prstGeom>
+              <a:ln w="73660">
+                <a:solidFill>
+                  <a:schemeClr val="tx1"/>
+                </a:solidFill>
+                <a:prstDash val="solid"/>
+                <a:tailEnd type="triangle" w="med" len="med"/>
+              </a:ln>
+            </p:spPr>
+            <p:style>
+              <a:lnRef idx="1">
+                <a:schemeClr val="accent1"/>
+              </a:lnRef>
+              <a:fillRef idx="0">
+                <a:schemeClr val="accent1"/>
+              </a:fillRef>
+              <a:effectRef idx="0">
+                <a:schemeClr val="accent1"/>
+              </a:effectRef>
+              <a:fontRef idx="minor">
+                <a:schemeClr val="tx1"/>
+              </a:fontRef>
+            </p:style>
+          </p:cxnSp>
+          <p:sp>
+            <p:nvSpPr>
+              <p:cNvPr id="64" name="TextBox 63">
+                <a:extLst>
+                  <a:ext uri="{FF2B5EF4-FFF2-40B4-BE49-F238E27FC236}">
+                    <a16:creationId xmlns:a16="http://schemas.microsoft.com/office/drawing/2014/main" id="{7295F931-E579-1015-6A19-D2FFFF9F79F1}"/>
+                  </a:ext>
+                </a:extLst>
+              </p:cNvPr>
+              <p:cNvSpPr txBox="1"/>
+              <p:nvPr/>
+            </p:nvSpPr>
+            <p:spPr>
+              <a:xfrm>
+                <a:off x="3435386" y="5022588"/>
+                <a:ext cx="775160" cy="369332"/>
+              </a:xfrm>
+              <a:prstGeom prst="rect">
+                <a:avLst/>
+              </a:prstGeom>
+              <a:noFill/>
+            </p:spPr>
+            <p:txBody>
+              <a:bodyPr wrap="square" rtlCol="0">
+                <a:spAutoFit/>
+              </a:bodyPr>
+              <a:lstStyle/>
+              <a:p>
+                <a:pPr algn="ctr"/>
+                <a:r>
+                  <a:rPr lang="en-US" dirty="0"/>
+                  <a:t>–0.23</a:t>
+                </a:r>
+              </a:p>
+            </p:txBody>
+          </p:sp>
+          <p:sp>
+            <p:nvSpPr>
+              <p:cNvPr id="65" name="TextBox 64">
+                <a:extLst>
+                  <a:ext uri="{FF2B5EF4-FFF2-40B4-BE49-F238E27FC236}">
+                    <a16:creationId xmlns:a16="http://schemas.microsoft.com/office/drawing/2014/main" id="{B24E99BA-486E-FF61-BFE9-7609A0D38240}"/>
+                  </a:ext>
+                </a:extLst>
+              </p:cNvPr>
+              <p:cNvSpPr txBox="1"/>
+              <p:nvPr/>
+            </p:nvSpPr>
+            <p:spPr>
+              <a:xfrm>
+                <a:off x="1291341" y="3087862"/>
+                <a:ext cx="800189" cy="369332"/>
+              </a:xfrm>
+              <a:prstGeom prst="rect">
+                <a:avLst/>
+              </a:prstGeom>
+              <a:noFill/>
+              <a:ln>
+                <a:noFill/>
+              </a:ln>
+            </p:spPr>
+            <p:txBody>
+              <a:bodyPr wrap="square" rtlCol="0">
+                <a:spAutoFit/>
+              </a:bodyPr>
+              <a:lstStyle/>
+              <a:p>
+                <a:pPr algn="ctr"/>
+                <a:r>
+                  <a:rPr lang="en-US" dirty="0"/>
+                  <a:t>–0.01</a:t>
+                </a:r>
+              </a:p>
+            </p:txBody>
+          </p:sp>
+          <p:sp>
+            <p:nvSpPr>
+              <p:cNvPr id="66" name="TextBox 65">
+                <a:extLst>
+                  <a:ext uri="{FF2B5EF4-FFF2-40B4-BE49-F238E27FC236}">
+                    <a16:creationId xmlns:a16="http://schemas.microsoft.com/office/drawing/2014/main" id="{3A42D8C9-C9CB-2E8C-232E-A889EE8CE967}"/>
+                  </a:ext>
+                </a:extLst>
+              </p:cNvPr>
+              <p:cNvSpPr txBox="1"/>
+              <p:nvPr/>
+            </p:nvSpPr>
+            <p:spPr>
+              <a:xfrm>
+                <a:off x="2050975" y="3762349"/>
+                <a:ext cx="669876" cy="369332"/>
+              </a:xfrm>
+              <a:prstGeom prst="rect">
+                <a:avLst/>
+              </a:prstGeom>
+              <a:noFill/>
+              <a:ln>
+                <a:noFill/>
+              </a:ln>
+            </p:spPr>
+            <p:txBody>
+              <a:bodyPr wrap="square" rtlCol="0">
+                <a:spAutoFit/>
+              </a:bodyPr>
+              <a:lstStyle/>
+              <a:p>
+                <a:pPr algn="ctr"/>
+                <a:r>
+                  <a:rPr lang="en-US" dirty="0"/>
+                  <a:t>0.22</a:t>
+                </a:r>
+              </a:p>
+            </p:txBody>
+          </p:sp>
+          <p:cxnSp>
+            <p:nvCxnSpPr>
+              <p:cNvPr id="67" name="Straight Arrow Connector 66">
+                <a:extLst>
+                  <a:ext uri="{FF2B5EF4-FFF2-40B4-BE49-F238E27FC236}">
+                    <a16:creationId xmlns:a16="http://schemas.microsoft.com/office/drawing/2014/main" id="{7E8AF326-549F-6D33-E40A-B3021987818C}"/>
+                  </a:ext>
+                </a:extLst>
+              </p:cNvPr>
+              <p:cNvCxnSpPr>
+                <a:cxnSpLocks/>
+                <a:stCxn id="69" idx="3"/>
+              </p:cNvCxnSpPr>
+              <p:nvPr/>
+            </p:nvCxnSpPr>
+            <p:spPr>
+              <a:xfrm>
+                <a:off x="1335748" y="3445843"/>
+                <a:ext cx="924443" cy="2046743"/>
+              </a:xfrm>
+              <a:prstGeom prst="straightConnector1">
+                <a:avLst/>
+              </a:prstGeom>
+              <a:ln w="38100">
+                <a:solidFill>
+                  <a:schemeClr val="tx1"/>
+                </a:solidFill>
+                <a:prstDash val="sysDot"/>
+                <a:tailEnd type="triangle" w="lg" len="lg"/>
+              </a:ln>
+            </p:spPr>
+            <p:style>
+              <a:lnRef idx="1">
+                <a:schemeClr val="accent1"/>
+              </a:lnRef>
+              <a:fillRef idx="0">
+                <a:schemeClr val="accent1"/>
+              </a:fillRef>
+              <a:effectRef idx="0">
+                <a:schemeClr val="accent1"/>
+              </a:effectRef>
+              <a:fontRef idx="minor">
+                <a:schemeClr val="tx1"/>
+              </a:fontRef>
+            </p:style>
+          </p:cxnSp>
+          <p:sp>
+            <p:nvSpPr>
+              <p:cNvPr id="68" name="TextBox 67">
+                <a:extLst>
+                  <a:ext uri="{FF2B5EF4-FFF2-40B4-BE49-F238E27FC236}">
+                    <a16:creationId xmlns:a16="http://schemas.microsoft.com/office/drawing/2014/main" id="{9DED061C-C859-9A35-027C-0E4481F7F340}"/>
+                  </a:ext>
+                </a:extLst>
+              </p:cNvPr>
+              <p:cNvSpPr txBox="1"/>
+              <p:nvPr/>
+            </p:nvSpPr>
+            <p:spPr>
+              <a:xfrm>
+                <a:off x="1189644" y="4434323"/>
+                <a:ext cx="669876" cy="369332"/>
+              </a:xfrm>
+              <a:prstGeom prst="rect">
+                <a:avLst/>
+              </a:prstGeom>
+              <a:noFill/>
+              <a:ln>
+                <a:noFill/>
+              </a:ln>
+            </p:spPr>
+            <p:txBody>
+              <a:bodyPr wrap="square" rtlCol="0">
+                <a:spAutoFit/>
+              </a:bodyPr>
+              <a:lstStyle/>
+              <a:p>
+                <a:pPr algn="ctr"/>
+                <a:r>
+                  <a:rPr lang="en-US" dirty="0"/>
+                  <a:t>0.05</a:t>
+                </a:r>
+              </a:p>
+            </p:txBody>
+          </p:sp>
+          <p:sp>
+            <p:nvSpPr>
+              <p:cNvPr id="69" name="TextBox 68">
+                <a:extLst>
+                  <a:ext uri="{FF2B5EF4-FFF2-40B4-BE49-F238E27FC236}">
+                    <a16:creationId xmlns:a16="http://schemas.microsoft.com/office/drawing/2014/main" id="{6AE45A5C-A698-1651-0E19-F6DF6ABE5202}"/>
+                  </a:ext>
+                </a:extLst>
+              </p:cNvPr>
+              <p:cNvSpPr txBox="1"/>
+              <p:nvPr/>
+            </p:nvSpPr>
+            <p:spPr>
+              <a:xfrm>
+                <a:off x="435822" y="3261177"/>
+                <a:ext cx="899926" cy="369332"/>
+              </a:xfrm>
+              <a:prstGeom prst="rect">
+                <a:avLst/>
+              </a:prstGeom>
+              <a:solidFill>
+                <a:schemeClr val="bg1"/>
+              </a:solidFill>
+              <a:ln>
+                <a:solidFill>
+                  <a:schemeClr val="tx1"/>
+                </a:solidFill>
+              </a:ln>
+            </p:spPr>
+            <p:txBody>
+              <a:bodyPr wrap="square" rtlCol="0">
+                <a:spAutoFit/>
+              </a:bodyPr>
+              <a:lstStyle/>
+              <a:p>
+                <a:pPr algn="ctr"/>
+                <a:r>
+                  <a:rPr lang="en-US" b="1" dirty="0"/>
+                  <a:t>Mixing</a:t>
+                </a:r>
+              </a:p>
+            </p:txBody>
+          </p:sp>
+          <p:sp>
+            <p:nvSpPr>
+              <p:cNvPr id="70" name="TextBox 69">
+                <a:extLst>
+                  <a:ext uri="{FF2B5EF4-FFF2-40B4-BE49-F238E27FC236}">
+                    <a16:creationId xmlns:a16="http://schemas.microsoft.com/office/drawing/2014/main" id="{4B00EBE4-804F-19A6-DD9B-63DEE8B633DD}"/>
+                  </a:ext>
+                </a:extLst>
+              </p:cNvPr>
+              <p:cNvSpPr txBox="1"/>
+              <p:nvPr/>
+            </p:nvSpPr>
+            <p:spPr>
+              <a:xfrm>
+                <a:off x="2428616" y="4427147"/>
+                <a:ext cx="1924491" cy="369332"/>
+              </a:xfrm>
+              <a:prstGeom prst="rect">
+                <a:avLst/>
+              </a:prstGeom>
+              <a:solidFill>
+                <a:schemeClr val="bg1"/>
+              </a:solidFill>
+              <a:ln>
+                <a:solidFill>
+                  <a:schemeClr val="tx1"/>
+                </a:solidFill>
+              </a:ln>
+            </p:spPr>
+            <p:txBody>
+              <a:bodyPr wrap="square" rtlCol="0">
+                <a:spAutoFit/>
+              </a:bodyPr>
+              <a:lstStyle/>
+              <a:p>
+                <a:pPr algn="ctr"/>
+                <a:r>
+                  <a:rPr lang="en-US" dirty="0"/>
+                  <a:t>Total host density</a:t>
+                </a:r>
+              </a:p>
+            </p:txBody>
+          </p:sp>
+          <p:sp>
+            <p:nvSpPr>
+              <p:cNvPr id="71" name="TextBox 70">
+                <a:extLst>
+                  <a:ext uri="{FF2B5EF4-FFF2-40B4-BE49-F238E27FC236}">
+                    <a16:creationId xmlns:a16="http://schemas.microsoft.com/office/drawing/2014/main" id="{80C546D6-5CE3-96B2-8C43-2B624D536E61}"/>
+                  </a:ext>
+                </a:extLst>
+              </p:cNvPr>
+              <p:cNvSpPr txBox="1"/>
+              <p:nvPr/>
+            </p:nvSpPr>
+            <p:spPr>
+              <a:xfrm>
+                <a:off x="2264524" y="5483333"/>
+                <a:ext cx="2171225" cy="646331"/>
+              </a:xfrm>
+              <a:prstGeom prst="rect">
+                <a:avLst/>
+              </a:prstGeom>
+              <a:solidFill>
+                <a:schemeClr val="bg1"/>
+              </a:solidFill>
+              <a:ln>
+                <a:solidFill>
+                  <a:schemeClr val="tx1"/>
+                </a:solidFill>
+              </a:ln>
+            </p:spPr>
+            <p:txBody>
+              <a:bodyPr wrap="square" rtlCol="0">
+                <a:spAutoFit/>
+              </a:bodyPr>
+              <a:lstStyle/>
+              <a:p>
+                <a:pPr algn="ctr"/>
+                <a:r>
+                  <a:rPr lang="en-US" dirty="0"/>
+                  <a:t>Phytoplankton</a:t>
+                </a:r>
+              </a:p>
+              <a:p>
+                <a:pPr algn="ctr"/>
+                <a:r>
+                  <a:rPr lang="en-US" dirty="0"/>
+                  <a:t>(edible </a:t>
+                </a:r>
+                <a:r>
+                  <a:rPr lang="en-US"/>
+                  <a:t>chlorophyll </a:t>
+                </a:r>
+                <a:r>
+                  <a:rPr lang="en-US" i="1"/>
+                  <a:t>a</a:t>
+                </a:r>
+                <a:r>
+                  <a:rPr lang="en-US"/>
+                  <a:t>)</a:t>
+                </a:r>
+                <a:endParaRPr lang="en-US" dirty="0"/>
+              </a:p>
+            </p:txBody>
+          </p:sp>
+        </p:grpSp>
+        <p:sp>
+          <p:nvSpPr>
+            <p:cNvPr id="44" name="TextBox 43">
+              <a:extLst>
+                <a:ext uri="{FF2B5EF4-FFF2-40B4-BE49-F238E27FC236}">
+                  <a16:creationId xmlns:a16="http://schemas.microsoft.com/office/drawing/2014/main" id="{BF0AB6DB-E834-ECC0-CCD5-DABC182BD0DB}"/>
+                </a:ext>
+              </a:extLst>
+            </p:cNvPr>
+            <p:cNvSpPr txBox="1"/>
+            <p:nvPr/>
+          </p:nvSpPr>
+          <p:spPr>
+            <a:xfrm>
+              <a:off x="693274" y="1079878"/>
+              <a:ext cx="3754536" cy="369332"/>
+            </a:xfrm>
+            <a:prstGeom prst="rect">
+              <a:avLst/>
+            </a:prstGeom>
+            <a:noFill/>
+          </p:spPr>
+          <p:txBody>
+            <a:bodyPr wrap="square" rtlCol="0">
+              <a:spAutoFit/>
+            </a:bodyPr>
+            <a:lstStyle/>
+            <a:p>
+              <a:r>
+                <a:rPr lang="en-US" b="1" dirty="0"/>
+                <a:t>b. </a:t>
+              </a:r>
+              <a:r>
+                <a:rPr lang="en-US" sz="1800" b="1" i="0" u="none" strike="noStrike" dirty="0">
+                  <a:solidFill>
+                    <a:srgbClr val="000000"/>
+                  </a:solidFill>
+                  <a:effectLst/>
+                </a:rPr>
+                <a:t>Parasite with TN</a:t>
+              </a:r>
+              <a:endParaRPr lang="en-US" b="1" dirty="0"/>
+            </a:p>
+          </p:txBody>
+        </p:sp>
+        <p:sp>
+          <p:nvSpPr>
+            <p:cNvPr id="45" name="TextBox 44">
+              <a:extLst>
+                <a:ext uri="{FF2B5EF4-FFF2-40B4-BE49-F238E27FC236}">
+                  <a16:creationId xmlns:a16="http://schemas.microsoft.com/office/drawing/2014/main" id="{D3CCFD88-F6D0-D0A6-6DC6-8C0B6B3DE3DB}"/>
+                </a:ext>
+              </a:extLst>
+            </p:cNvPr>
+            <p:cNvSpPr txBox="1"/>
+            <p:nvPr/>
+          </p:nvSpPr>
+          <p:spPr>
+            <a:xfrm>
+              <a:off x="2420691" y="1641458"/>
+              <a:ext cx="2368337" cy="646331"/>
+            </a:xfrm>
+            <a:prstGeom prst="rect">
+              <a:avLst/>
+            </a:prstGeom>
+            <a:noFill/>
+            <a:ln>
+              <a:solidFill>
+                <a:schemeClr val="tx1"/>
+              </a:solidFill>
+            </a:ln>
+          </p:spPr>
+          <p:txBody>
+            <a:bodyPr wrap="square" rtlCol="0">
+              <a:spAutoFit/>
+            </a:bodyPr>
+            <a:lstStyle/>
+            <a:p>
+              <a:pPr algn="ctr"/>
+              <a:r>
+                <a:rPr lang="en-US" dirty="0"/>
+                <a:t>Epidemic size </a:t>
+              </a:r>
+            </a:p>
+            <a:p>
+              <a:pPr algn="ctr"/>
+              <a:r>
+                <a:rPr lang="en-US" dirty="0"/>
+                <a:t>(infection prevalence)</a:t>
+              </a:r>
+            </a:p>
+          </p:txBody>
+        </p:sp>
+        <p:cxnSp>
+          <p:nvCxnSpPr>
+            <p:cNvPr id="46" name="Connector: Curved 45">
+              <a:extLst>
+                <a:ext uri="{FF2B5EF4-FFF2-40B4-BE49-F238E27FC236}">
+                  <a16:creationId xmlns:a16="http://schemas.microsoft.com/office/drawing/2014/main" id="{00F5EE8B-9F53-7435-7FDE-3649BA539202}"/>
+                </a:ext>
+              </a:extLst>
+            </p:cNvPr>
+            <p:cNvCxnSpPr>
+              <a:cxnSpLocks/>
+              <a:endCxn id="45" idx="3"/>
+            </p:cNvCxnSpPr>
+            <p:nvPr/>
+          </p:nvCxnSpPr>
+          <p:spPr>
+            <a:xfrm flipV="1">
+              <a:off x="4700082" y="1964624"/>
+              <a:ext cx="88946" cy="2343417"/>
+            </a:xfrm>
+            <a:prstGeom prst="curvedConnector3">
+              <a:avLst>
+                <a:gd name="adj1" fmla="val 719271"/>
+              </a:avLst>
+            </a:prstGeom>
+            <a:ln w="38100">
+              <a:prstDash val="sysDot"/>
+              <a:tailEnd type="triangle" w="lg" len="lg"/>
+            </a:ln>
+          </p:spPr>
+          <p:style>
+            <a:lnRef idx="1">
+              <a:schemeClr val="dk1"/>
+            </a:lnRef>
+            <a:fillRef idx="0">
+              <a:schemeClr val="dk1"/>
+            </a:fillRef>
+            <a:effectRef idx="0">
+              <a:schemeClr val="dk1"/>
+            </a:effectRef>
+            <a:fontRef idx="minor">
+              <a:schemeClr val="tx1"/>
+            </a:fontRef>
+          </p:style>
+        </p:cxnSp>
+        <p:sp>
+          <p:nvSpPr>
+            <p:cNvPr id="47" name="TextBox 46">
+              <a:extLst>
+                <a:ext uri="{FF2B5EF4-FFF2-40B4-BE49-F238E27FC236}">
+                  <a16:creationId xmlns:a16="http://schemas.microsoft.com/office/drawing/2014/main" id="{6304FA0E-A411-AFF3-50C2-C531B61B8DC3}"/>
+                </a:ext>
+              </a:extLst>
+            </p:cNvPr>
+            <p:cNvSpPr txBox="1"/>
+            <p:nvPr/>
+          </p:nvSpPr>
+          <p:spPr>
+            <a:xfrm>
+              <a:off x="5283953" y="2951470"/>
+              <a:ext cx="864650" cy="369332"/>
+            </a:xfrm>
+            <a:prstGeom prst="rect">
+              <a:avLst/>
+            </a:prstGeom>
+            <a:noFill/>
+          </p:spPr>
+          <p:txBody>
+            <a:bodyPr wrap="square" rtlCol="0">
+              <a:spAutoFit/>
+            </a:bodyPr>
+            <a:lstStyle/>
+            <a:p>
+              <a:pPr algn="ctr"/>
+              <a:r>
+                <a:rPr lang="en-US" dirty="0"/>
+                <a:t>–0.07</a:t>
+              </a:r>
+            </a:p>
+          </p:txBody>
+        </p:sp>
+      </p:grpSp>
+      <p:cxnSp>
+        <p:nvCxnSpPr>
+          <p:cNvPr id="75" name="Straight Arrow Connector 74">
+            <a:extLst>
+              <a:ext uri="{FF2B5EF4-FFF2-40B4-BE49-F238E27FC236}">
+                <a16:creationId xmlns:a16="http://schemas.microsoft.com/office/drawing/2014/main" id="{B7FFE2B0-272D-CA1E-8A5E-290956DFA4D4}"/>
+              </a:ext>
+            </a:extLst>
+          </p:cNvPr>
+          <p:cNvCxnSpPr>
+            <a:cxnSpLocks/>
+          </p:cNvCxnSpPr>
+          <p:nvPr/>
+        </p:nvCxnSpPr>
+        <p:spPr>
+          <a:xfrm flipV="1">
+            <a:off x="3148752" y="1492475"/>
+            <a:ext cx="0" cy="675852"/>
+          </a:xfrm>
+          <a:prstGeom prst="straightConnector1">
+            <a:avLst/>
+          </a:prstGeom>
+          <a:ln w="38100">
+            <a:solidFill>
+              <a:schemeClr val="tx1"/>
+            </a:solidFill>
+            <a:prstDash val="sysDot"/>
+            <a:tailEnd type="triangle" w="lg" len="lg"/>
+          </a:ln>
+        </p:spPr>
+        <p:style>
+          <a:lnRef idx="1">
+            <a:schemeClr val="accent1"/>
+          </a:lnRef>
+          <a:fillRef idx="0">
+            <a:schemeClr val="accent1"/>
+          </a:fillRef>
+          <a:effectRef idx="0">
+            <a:schemeClr val="accent1"/>
+          </a:effectRef>
+          <a:fontRef idx="minor">
+            <a:schemeClr val="tx1"/>
+          </a:fontRef>
+        </p:style>
+      </p:cxnSp>
+      <p:cxnSp>
+        <p:nvCxnSpPr>
+          <p:cNvPr id="76" name="Connector: Curved 75">
+            <a:extLst>
+              <a:ext uri="{FF2B5EF4-FFF2-40B4-BE49-F238E27FC236}">
+                <a16:creationId xmlns:a16="http://schemas.microsoft.com/office/drawing/2014/main" id="{7E957F69-2AFD-A3F6-D324-AD7B4C58E224}"/>
+              </a:ext>
+            </a:extLst>
+          </p:cNvPr>
+          <p:cNvCxnSpPr>
+            <a:cxnSpLocks/>
+          </p:cNvCxnSpPr>
+          <p:nvPr/>
+        </p:nvCxnSpPr>
+        <p:spPr>
+          <a:xfrm flipH="1">
+            <a:off x="4016258" y="1043820"/>
+            <a:ext cx="284210" cy="4193717"/>
+          </a:xfrm>
+          <a:prstGeom prst="curvedConnector3">
+            <a:avLst>
+              <a:gd name="adj1" fmla="val -513927"/>
+            </a:avLst>
+          </a:prstGeom>
+          <a:ln w="38100">
+            <a:solidFill>
+              <a:schemeClr val="tx1"/>
+            </a:solidFill>
+            <a:prstDash val="solid"/>
+            <a:headEnd type="triangle" w="lg" len="lg"/>
+            <a:tailEnd type="triangle" w="lg" len="lg"/>
+          </a:ln>
+        </p:spPr>
+        <p:style>
+          <a:lnRef idx="1">
+            <a:schemeClr val="accent1"/>
+          </a:lnRef>
+          <a:fillRef idx="0">
+            <a:schemeClr val="accent1"/>
+          </a:fillRef>
+          <a:effectRef idx="0">
+            <a:schemeClr val="accent1"/>
+          </a:effectRef>
+          <a:fontRef idx="minor">
+            <a:schemeClr val="tx1"/>
+          </a:fontRef>
+        </p:style>
+      </p:cxnSp>
+      <p:sp>
+        <p:nvSpPr>
+          <p:cNvPr id="88" name="TextBox 87">
+            <a:extLst>
+              <a:ext uri="{FF2B5EF4-FFF2-40B4-BE49-F238E27FC236}">
+                <a16:creationId xmlns:a16="http://schemas.microsoft.com/office/drawing/2014/main" id="{2090C9A7-D207-6274-37D9-33EB668A6A94}"/>
+              </a:ext>
+            </a:extLst>
+          </p:cNvPr>
+          <p:cNvSpPr txBox="1"/>
+          <p:nvPr/>
+        </p:nvSpPr>
+        <p:spPr>
+          <a:xfrm>
+            <a:off x="5696121" y="3024818"/>
+            <a:ext cx="1137816" cy="369332"/>
+          </a:xfrm>
+          <a:prstGeom prst="rect">
+            <a:avLst/>
+          </a:prstGeom>
+          <a:noFill/>
+        </p:spPr>
+        <p:txBody>
+          <a:bodyPr wrap="square" rtlCol="0">
+            <a:spAutoFit/>
+          </a:bodyPr>
+          <a:lstStyle/>
+          <a:p>
+            <a:pPr algn="ctr"/>
+            <a:r>
+              <a:rPr lang="en-US" dirty="0"/>
+              <a:t>–0.49***</a:t>
+            </a:r>
+          </a:p>
+        </p:txBody>
+      </p:sp>
+    </p:spTree>
+    <p:extLst>
+      <p:ext uri="{BB962C8B-B14F-4D97-AF65-F5344CB8AC3E}">
+        <p14:creationId xmlns:p14="http://schemas.microsoft.com/office/powerpoint/2010/main" val="4004654632"/>
       </p:ext>
     </p:extLst>
   </p:cSld>

</xml_diff>

<commit_message>
turn negative links red
</commit_message>
<xml_diff>
--- a/figures/BagExpt_SEM_Final_Figures.pptx
+++ b/figures/BagExpt_SEM_Final_Figures.pptx
@@ -127,7 +127,7 @@
   <pc:docChgLst>
     <pc:chgData name="Fearon, Michelle" userId="a9975605-5b01-4453-b093-ebef4a050471" providerId="ADAL" clId="{D4C2BEA3-74EB-4C94-A611-476267974A9F}"/>
     <pc:docChg chg="undo custSel addSld modSld">
-      <pc:chgData name="Fearon, Michelle" userId="a9975605-5b01-4453-b093-ebef4a050471" providerId="ADAL" clId="{D4C2BEA3-74EB-4C94-A611-476267974A9F}" dt="2023-01-26T14:19:54.022" v="934" actId="14100"/>
+      <pc:chgData name="Fearon, Michelle" userId="a9975605-5b01-4453-b093-ebef4a050471" providerId="ADAL" clId="{D4C2BEA3-74EB-4C94-A611-476267974A9F}" dt="2023-01-26T17:19:43.861" v="938" actId="1038"/>
       <pc:docMkLst>
         <pc:docMk/>
       </pc:docMkLst>
@@ -698,7 +698,7 @@
         </pc:cxnChg>
       </pc:sldChg>
       <pc:sldChg chg="addSp delSp modSp add mod">
-        <pc:chgData name="Fearon, Michelle" userId="a9975605-5b01-4453-b093-ebef4a050471" providerId="ADAL" clId="{D4C2BEA3-74EB-4C94-A611-476267974A9F}" dt="2023-01-26T14:19:54.022" v="934" actId="14100"/>
+        <pc:chgData name="Fearon, Michelle" userId="a9975605-5b01-4453-b093-ebef4a050471" providerId="ADAL" clId="{D4C2BEA3-74EB-4C94-A611-476267974A9F}" dt="2023-01-26T17:19:43.861" v="938" actId="1038"/>
         <pc:sldMkLst>
           <pc:docMk/>
           <pc:sldMk cId="4004654632" sldId="258"/>
@@ -896,7 +896,7 @@
           </ac:spMkLst>
         </pc:spChg>
         <pc:spChg chg="add mod">
-          <ac:chgData name="Fearon, Michelle" userId="a9975605-5b01-4453-b093-ebef4a050471" providerId="ADAL" clId="{D4C2BEA3-74EB-4C94-A611-476267974A9F}" dt="2023-01-26T14:19:54.022" v="934" actId="14100"/>
+          <ac:chgData name="Fearon, Michelle" userId="a9975605-5b01-4453-b093-ebef4a050471" providerId="ADAL" clId="{D4C2BEA3-74EB-4C94-A611-476267974A9F}" dt="2023-01-26T17:19:25.355" v="936" actId="207"/>
           <ac:spMkLst>
             <pc:docMk/>
             <pc:sldMk cId="4004654632" sldId="258"/>
@@ -1056,7 +1056,7 @@
           </ac:cxnSpMkLst>
         </pc:cxnChg>
         <pc:cxnChg chg="add mod">
-          <ac:chgData name="Fearon, Michelle" userId="a9975605-5b01-4453-b093-ebef4a050471" providerId="ADAL" clId="{D4C2BEA3-74EB-4C94-A611-476267974A9F}" dt="2023-01-26T14:19:20.094" v="924" actId="14100"/>
+          <ac:chgData name="Fearon, Michelle" userId="a9975605-5b01-4453-b093-ebef4a050471" providerId="ADAL" clId="{D4C2BEA3-74EB-4C94-A611-476267974A9F}" dt="2023-01-26T17:19:43.861" v="938" actId="1038"/>
           <ac:cxnSpMkLst>
             <pc:docMk/>
             <pc:sldMk cId="4004654632" sldId="258"/>
@@ -10158,7 +10158,7 @@
         </p:nvCxnSpPr>
         <p:spPr>
           <a:xfrm flipH="1">
-            <a:off x="4016258" y="1043820"/>
+            <a:off x="4033676" y="1043820"/>
             <a:ext cx="284210" cy="4193717"/>
           </a:xfrm>
           <a:prstGeom prst="curvedConnector3">
@@ -10168,7 +10168,7 @@
           </a:prstGeom>
           <a:ln w="38100">
             <a:solidFill>
-              <a:schemeClr val="tx1"/>
+              <a:srgbClr val="C00000"/>
             </a:solidFill>
             <a:prstDash val="solid"/>
             <a:headEnd type="triangle" w="lg" len="lg"/>
@@ -10220,7 +10220,11 @@
           <a:p>
             <a:pPr algn="ctr"/>
             <a:r>
-              <a:rPr lang="en-US" dirty="0"/>
+              <a:rPr lang="en-US" dirty="0">
+                <a:solidFill>
+                  <a:srgbClr val="C00000"/>
+                </a:solidFill>
+              </a:rPr>
               <a:t>–0.49***</a:t>
             </a:r>
           </a:p>

</xml_diff>